<commit_message>
Add documentation about buffered images with custom format.
</commit_message>
<xml_diff>
--- a/VEEPortingGuide/images/uiLL.pptx
+++ b/VEEPortingGuide/images/uiLL.pptx
@@ -202,7 +202,7 @@
           <a:p>
             <a:fld id="{F47202D6-4449-4ABC-9430-570B72DCED4F}" type="datetimeFigureOut">
               <a:rPr lang="en-US" smtClean="0"/>
-              <a:t>21/07/19</a:t>
+              <a:t>4/25/23</a:t>
             </a:fld>
             <a:endParaRPr lang="en-US"/>
           </a:p>
@@ -702,7 +702,7 @@
           <a:p>
             <a:fld id="{4E285625-C24A-4341-90BC-6CD71F835625}" type="datetimeFigureOut">
               <a:rPr lang="en-GB" smtClean="0"/>
-              <a:t>19/07/2021</a:t>
+              <a:t>25/04/2023</a:t>
             </a:fld>
             <a:endParaRPr lang="en-GB"/>
           </a:p>
@@ -902,7 +902,7 @@
           <a:p>
             <a:fld id="{4E285625-C24A-4341-90BC-6CD71F835625}" type="datetimeFigureOut">
               <a:rPr lang="en-GB" smtClean="0"/>
-              <a:t>19/07/2021</a:t>
+              <a:t>25/04/2023</a:t>
             </a:fld>
             <a:endParaRPr lang="en-GB"/>
           </a:p>
@@ -1112,7 +1112,7 @@
           <a:p>
             <a:fld id="{4E285625-C24A-4341-90BC-6CD71F835625}" type="datetimeFigureOut">
               <a:rPr lang="en-GB" smtClean="0"/>
-              <a:t>19/07/2021</a:t>
+              <a:t>25/04/2023</a:t>
             </a:fld>
             <a:endParaRPr lang="en-GB"/>
           </a:p>
@@ -1312,7 +1312,7 @@
           <a:p>
             <a:fld id="{4E285625-C24A-4341-90BC-6CD71F835625}" type="datetimeFigureOut">
               <a:rPr lang="en-GB" smtClean="0"/>
-              <a:t>19/07/2021</a:t>
+              <a:t>25/04/2023</a:t>
             </a:fld>
             <a:endParaRPr lang="en-GB"/>
           </a:p>
@@ -1588,7 +1588,7 @@
           <a:p>
             <a:fld id="{4E285625-C24A-4341-90BC-6CD71F835625}" type="datetimeFigureOut">
               <a:rPr lang="en-GB" smtClean="0"/>
-              <a:t>19/07/2021</a:t>
+              <a:t>25/04/2023</a:t>
             </a:fld>
             <a:endParaRPr lang="en-GB"/>
           </a:p>
@@ -1856,7 +1856,7 @@
           <a:p>
             <a:fld id="{4E285625-C24A-4341-90BC-6CD71F835625}" type="datetimeFigureOut">
               <a:rPr lang="en-GB" smtClean="0"/>
-              <a:t>19/07/2021</a:t>
+              <a:t>25/04/2023</a:t>
             </a:fld>
             <a:endParaRPr lang="en-GB"/>
           </a:p>
@@ -2271,7 +2271,7 @@
           <a:p>
             <a:fld id="{4E285625-C24A-4341-90BC-6CD71F835625}" type="datetimeFigureOut">
               <a:rPr lang="en-GB" smtClean="0"/>
-              <a:t>19/07/2021</a:t>
+              <a:t>25/04/2023</a:t>
             </a:fld>
             <a:endParaRPr lang="en-GB"/>
           </a:p>
@@ -2413,7 +2413,7 @@
           <a:p>
             <a:fld id="{4E285625-C24A-4341-90BC-6CD71F835625}" type="datetimeFigureOut">
               <a:rPr lang="en-GB" smtClean="0"/>
-              <a:t>19/07/2021</a:t>
+              <a:t>25/04/2023</a:t>
             </a:fld>
             <a:endParaRPr lang="en-GB"/>
           </a:p>
@@ -2526,7 +2526,7 @@
           <a:p>
             <a:fld id="{4E285625-C24A-4341-90BC-6CD71F835625}" type="datetimeFigureOut">
               <a:rPr lang="en-GB" smtClean="0"/>
-              <a:t>19/07/2021</a:t>
+              <a:t>25/04/2023</a:t>
             </a:fld>
             <a:endParaRPr lang="en-GB"/>
           </a:p>
@@ -2839,7 +2839,7 @@
           <a:p>
             <a:fld id="{4E285625-C24A-4341-90BC-6CD71F835625}" type="datetimeFigureOut">
               <a:rPr lang="en-GB" smtClean="0"/>
-              <a:t>19/07/2021</a:t>
+              <a:t>25/04/2023</a:t>
             </a:fld>
             <a:endParaRPr lang="en-GB"/>
           </a:p>
@@ -3128,7 +3128,7 @@
           <a:p>
             <a:fld id="{4E285625-C24A-4341-90BC-6CD71F835625}" type="datetimeFigureOut">
               <a:rPr lang="en-GB" smtClean="0"/>
-              <a:t>19/07/2021</a:t>
+              <a:t>25/04/2023</a:t>
             </a:fld>
             <a:endParaRPr lang="en-GB"/>
           </a:p>
@@ -3371,7 +3371,7 @@
           <a:p>
             <a:fld id="{4E285625-C24A-4341-90BC-6CD71F835625}" type="datetimeFigureOut">
               <a:rPr lang="en-GB" smtClean="0"/>
-              <a:t>19/07/2021</a:t>
+              <a:t>25/04/2023</a:t>
             </a:fld>
             <a:endParaRPr lang="en-GB"/>
           </a:p>
@@ -7758,7 +7758,7 @@
         <p:spPr>
           <a:xfrm>
             <a:off x="479375" y="1803599"/>
-            <a:ext cx="1645920" cy="288000"/>
+            <a:ext cx="1645918" cy="288000"/>
           </a:xfrm>
           <a:prstGeom prst="roundRect">
             <a:avLst/>
@@ -8125,8 +8125,8 @@
         </p:nvSpPr>
         <p:spPr>
           <a:xfrm>
-            <a:off x="4956065" y="1803599"/>
-            <a:ext cx="1645920" cy="288000"/>
+            <a:off x="3917373" y="1803599"/>
+            <a:ext cx="2684612" cy="288000"/>
           </a:xfrm>
           <a:prstGeom prst="roundRect">
             <a:avLst/>
@@ -8283,8 +8283,8 @@
         </p:nvSpPr>
         <p:spPr>
           <a:xfrm>
-            <a:off x="4956065" y="2206514"/>
-            <a:ext cx="1645920" cy="288000"/>
+            <a:off x="3917373" y="2209635"/>
+            <a:ext cx="1163782" cy="288000"/>
           </a:xfrm>
           <a:prstGeom prst="roundRect">
             <a:avLst/>
@@ -8441,8 +8441,8 @@
         </p:nvSpPr>
         <p:spPr>
           <a:xfrm>
-            <a:off x="2242809" y="2209635"/>
-            <a:ext cx="1280160" cy="288000"/>
+            <a:off x="2242808" y="2209635"/>
+            <a:ext cx="1557049" cy="288000"/>
           </a:xfrm>
           <a:prstGeom prst="roundRect">
             <a:avLst/>
@@ -8570,14 +8570,14 @@
           <a:p>
             <a:pPr algn="ctr"/>
             <a:r>
-              <a:rPr lang="en-US" sz="1100" dirty="0" err="1">
+              <a:rPr lang="en-US" sz="1200" dirty="0" err="1">
                 <a:solidFill>
                   <a:schemeClr val="bg1"/>
                 </a:solidFill>
               </a:rPr>
-              <a:t>UIDrawingDefault</a:t>
+              <a:t>DisplayDrawer</a:t>
             </a:r>
-            <a:endParaRPr lang="en-US" sz="1100" dirty="0">
+            <a:endParaRPr lang="en-US" sz="1200" dirty="0">
               <a:solidFill>
                 <a:schemeClr val="bg1"/>
               </a:solidFill>
@@ -10128,10 +10128,10 @@
       </p:sp>
       <p:sp>
         <p:nvSpPr>
-          <p:cNvPr id="47" name="Rounded Rectangle 19">
-            <a:extLst>
-              <a:ext uri="{FF2B5EF4-FFF2-40B4-BE49-F238E27FC236}">
-                <a16:creationId xmlns:a16="http://schemas.microsoft.com/office/drawing/2014/main" id="{6CCAB5E7-AEA6-499E-8E3A-8018D98658CB}"/>
+          <p:cNvPr id="51" name="Rounded Rectangle 11">
+            <a:extLst>
+              <a:ext uri="{FF2B5EF4-FFF2-40B4-BE49-F238E27FC236}">
+                <a16:creationId xmlns:a16="http://schemas.microsoft.com/office/drawing/2014/main" id="{9A02C670-7839-478C-8E5F-B5000F4FC315}"/>
               </a:ext>
             </a:extLst>
           </p:cNvPr>
@@ -10140,324 +10140,8 @@
         </p:nvSpPr>
         <p:spPr>
           <a:xfrm>
-            <a:off x="10213862" y="2203332"/>
-            <a:ext cx="1645920" cy="288000"/>
-          </a:xfrm>
-          <a:prstGeom prst="roundRect">
-            <a:avLst/>
-          </a:prstGeom>
-          <a:solidFill>
-            <a:srgbClr val="00AEC7"/>
-          </a:solidFill>
-          <a:ln>
-            <a:noFill/>
-          </a:ln>
-        </p:spPr>
-        <p:style>
-          <a:lnRef idx="2">
-            <a:schemeClr val="accent1">
-              <a:shade val="50000"/>
-            </a:schemeClr>
-          </a:lnRef>
-          <a:fillRef idx="1">
-            <a:schemeClr val="accent1"/>
-          </a:fillRef>
-          <a:effectRef idx="0">
-            <a:schemeClr val="accent1"/>
-          </a:effectRef>
-          <a:fontRef idx="minor">
-            <a:schemeClr val="lt1"/>
-          </a:fontRef>
-        </p:style>
-        <p:txBody>
-          <a:bodyPr rtlCol="0" anchor="ctr"/>
-          <a:lstStyle>
-            <a:defPPr>
-              <a:defRPr lang="en-US"/>
-            </a:defPPr>
-            <a:lvl1pPr marL="0" algn="l" defTabSz="914377" rtl="0" eaLnBrk="1" latinLnBrk="0" hangingPunct="1">
-              <a:defRPr sz="1800" kern="1200">
-                <a:solidFill>
-                  <a:schemeClr val="lt1"/>
-                </a:solidFill>
-                <a:latin typeface="+mn-lt"/>
-                <a:ea typeface="+mn-ea"/>
-                <a:cs typeface="+mn-cs"/>
-              </a:defRPr>
-            </a:lvl1pPr>
-            <a:lvl2pPr marL="457189" algn="l" defTabSz="914377" rtl="0" eaLnBrk="1" latinLnBrk="0" hangingPunct="1">
-              <a:defRPr sz="1800" kern="1200">
-                <a:solidFill>
-                  <a:schemeClr val="lt1"/>
-                </a:solidFill>
-                <a:latin typeface="+mn-lt"/>
-                <a:ea typeface="+mn-ea"/>
-                <a:cs typeface="+mn-cs"/>
-              </a:defRPr>
-            </a:lvl2pPr>
-            <a:lvl3pPr marL="914377" algn="l" defTabSz="914377" rtl="0" eaLnBrk="1" latinLnBrk="0" hangingPunct="1">
-              <a:defRPr sz="1800" kern="1200">
-                <a:solidFill>
-                  <a:schemeClr val="lt1"/>
-                </a:solidFill>
-                <a:latin typeface="+mn-lt"/>
-                <a:ea typeface="+mn-ea"/>
-                <a:cs typeface="+mn-cs"/>
-              </a:defRPr>
-            </a:lvl3pPr>
-            <a:lvl4pPr marL="1371566" algn="l" defTabSz="914377" rtl="0" eaLnBrk="1" latinLnBrk="0" hangingPunct="1">
-              <a:defRPr sz="1800" kern="1200">
-                <a:solidFill>
-                  <a:schemeClr val="lt1"/>
-                </a:solidFill>
-                <a:latin typeface="+mn-lt"/>
-                <a:ea typeface="+mn-ea"/>
-                <a:cs typeface="+mn-cs"/>
-              </a:defRPr>
-            </a:lvl4pPr>
-            <a:lvl5pPr marL="1828754" algn="l" defTabSz="914377" rtl="0" eaLnBrk="1" latinLnBrk="0" hangingPunct="1">
-              <a:defRPr sz="1800" kern="1200">
-                <a:solidFill>
-                  <a:schemeClr val="lt1"/>
-                </a:solidFill>
-                <a:latin typeface="+mn-lt"/>
-                <a:ea typeface="+mn-ea"/>
-                <a:cs typeface="+mn-cs"/>
-              </a:defRPr>
-            </a:lvl5pPr>
-            <a:lvl6pPr marL="2285943" algn="l" defTabSz="914377" rtl="0" eaLnBrk="1" latinLnBrk="0" hangingPunct="1">
-              <a:defRPr sz="1800" kern="1200">
-                <a:solidFill>
-                  <a:schemeClr val="lt1"/>
-                </a:solidFill>
-                <a:latin typeface="+mn-lt"/>
-                <a:ea typeface="+mn-ea"/>
-                <a:cs typeface="+mn-cs"/>
-              </a:defRPr>
-            </a:lvl6pPr>
-            <a:lvl7pPr marL="2743131" algn="l" defTabSz="914377" rtl="0" eaLnBrk="1" latinLnBrk="0" hangingPunct="1">
-              <a:defRPr sz="1800" kern="1200">
-                <a:solidFill>
-                  <a:schemeClr val="lt1"/>
-                </a:solidFill>
-                <a:latin typeface="+mn-lt"/>
-                <a:ea typeface="+mn-ea"/>
-                <a:cs typeface="+mn-cs"/>
-              </a:defRPr>
-            </a:lvl7pPr>
-            <a:lvl8pPr marL="3200320" algn="l" defTabSz="914377" rtl="0" eaLnBrk="1" latinLnBrk="0" hangingPunct="1">
-              <a:defRPr sz="1800" kern="1200">
-                <a:solidFill>
-                  <a:schemeClr val="lt1"/>
-                </a:solidFill>
-                <a:latin typeface="+mn-lt"/>
-                <a:ea typeface="+mn-ea"/>
-                <a:cs typeface="+mn-cs"/>
-              </a:defRPr>
-            </a:lvl8pPr>
-            <a:lvl9pPr marL="3657509" algn="l" defTabSz="914377" rtl="0" eaLnBrk="1" latinLnBrk="0" hangingPunct="1">
-              <a:defRPr sz="1800" kern="1200">
-                <a:solidFill>
-                  <a:schemeClr val="lt1"/>
-                </a:solidFill>
-                <a:latin typeface="+mn-lt"/>
-                <a:ea typeface="+mn-ea"/>
-                <a:cs typeface="+mn-cs"/>
-              </a:defRPr>
-            </a:lvl9pPr>
-          </a:lstStyle>
-          <a:p>
-            <a:pPr algn="ctr"/>
-            <a:r>
-              <a:rPr lang="en-US" sz="1200" dirty="0" err="1">
-                <a:solidFill>
-                  <a:schemeClr val="bg1"/>
-                </a:solidFill>
-              </a:rPr>
-              <a:t>DWDrawing</a:t>
-            </a:r>
-            <a:endParaRPr lang="en-US" sz="1200" dirty="0">
-              <a:solidFill>
-                <a:schemeClr val="bg1"/>
-              </a:solidFill>
-            </a:endParaRPr>
-          </a:p>
-        </p:txBody>
-      </p:sp>
-      <p:sp>
-        <p:nvSpPr>
-          <p:cNvPr id="49" name="Rounded Rectangle 19">
-            <a:extLst>
-              <a:ext uri="{FF2B5EF4-FFF2-40B4-BE49-F238E27FC236}">
-                <a16:creationId xmlns:a16="http://schemas.microsoft.com/office/drawing/2014/main" id="{4DA431B1-9F5A-4E06-9271-9337D9088256}"/>
-              </a:ext>
-            </a:extLst>
-          </p:cNvPr>
-          <p:cNvSpPr/>
-          <p:nvPr/>
-        </p:nvSpPr>
-        <p:spPr>
-          <a:xfrm>
-            <a:off x="3562843" y="2209635"/>
-            <a:ext cx="1280160" cy="288000"/>
-          </a:xfrm>
-          <a:prstGeom prst="roundRect">
-            <a:avLst/>
-          </a:prstGeom>
-          <a:solidFill>
-            <a:srgbClr val="00AEC7"/>
-          </a:solidFill>
-          <a:ln>
-            <a:noFill/>
-          </a:ln>
-        </p:spPr>
-        <p:style>
-          <a:lnRef idx="2">
-            <a:schemeClr val="accent1">
-              <a:shade val="50000"/>
-            </a:schemeClr>
-          </a:lnRef>
-          <a:fillRef idx="1">
-            <a:schemeClr val="accent1"/>
-          </a:fillRef>
-          <a:effectRef idx="0">
-            <a:schemeClr val="accent1"/>
-          </a:effectRef>
-          <a:fontRef idx="minor">
-            <a:schemeClr val="lt1"/>
-          </a:fontRef>
-        </p:style>
-        <p:txBody>
-          <a:bodyPr rtlCol="0" anchor="ctr"/>
-          <a:lstStyle>
-            <a:defPPr>
-              <a:defRPr lang="en-US"/>
-            </a:defPPr>
-            <a:lvl1pPr marL="0" algn="l" defTabSz="914377" rtl="0" eaLnBrk="1" latinLnBrk="0" hangingPunct="1">
-              <a:defRPr sz="1800" kern="1200">
-                <a:solidFill>
-                  <a:schemeClr val="lt1"/>
-                </a:solidFill>
-                <a:latin typeface="+mn-lt"/>
-                <a:ea typeface="+mn-ea"/>
-                <a:cs typeface="+mn-cs"/>
-              </a:defRPr>
-            </a:lvl1pPr>
-            <a:lvl2pPr marL="457189" algn="l" defTabSz="914377" rtl="0" eaLnBrk="1" latinLnBrk="0" hangingPunct="1">
-              <a:defRPr sz="1800" kern="1200">
-                <a:solidFill>
-                  <a:schemeClr val="lt1"/>
-                </a:solidFill>
-                <a:latin typeface="+mn-lt"/>
-                <a:ea typeface="+mn-ea"/>
-                <a:cs typeface="+mn-cs"/>
-              </a:defRPr>
-            </a:lvl2pPr>
-            <a:lvl3pPr marL="914377" algn="l" defTabSz="914377" rtl="0" eaLnBrk="1" latinLnBrk="0" hangingPunct="1">
-              <a:defRPr sz="1800" kern="1200">
-                <a:solidFill>
-                  <a:schemeClr val="lt1"/>
-                </a:solidFill>
-                <a:latin typeface="+mn-lt"/>
-                <a:ea typeface="+mn-ea"/>
-                <a:cs typeface="+mn-cs"/>
-              </a:defRPr>
-            </a:lvl3pPr>
-            <a:lvl4pPr marL="1371566" algn="l" defTabSz="914377" rtl="0" eaLnBrk="1" latinLnBrk="0" hangingPunct="1">
-              <a:defRPr sz="1800" kern="1200">
-                <a:solidFill>
-                  <a:schemeClr val="lt1"/>
-                </a:solidFill>
-                <a:latin typeface="+mn-lt"/>
-                <a:ea typeface="+mn-ea"/>
-                <a:cs typeface="+mn-cs"/>
-              </a:defRPr>
-            </a:lvl4pPr>
-            <a:lvl5pPr marL="1828754" algn="l" defTabSz="914377" rtl="0" eaLnBrk="1" latinLnBrk="0" hangingPunct="1">
-              <a:defRPr sz="1800" kern="1200">
-                <a:solidFill>
-                  <a:schemeClr val="lt1"/>
-                </a:solidFill>
-                <a:latin typeface="+mn-lt"/>
-                <a:ea typeface="+mn-ea"/>
-                <a:cs typeface="+mn-cs"/>
-              </a:defRPr>
-            </a:lvl5pPr>
-            <a:lvl6pPr marL="2285943" algn="l" defTabSz="914377" rtl="0" eaLnBrk="1" latinLnBrk="0" hangingPunct="1">
-              <a:defRPr sz="1800" kern="1200">
-                <a:solidFill>
-                  <a:schemeClr val="lt1"/>
-                </a:solidFill>
-                <a:latin typeface="+mn-lt"/>
-                <a:ea typeface="+mn-ea"/>
-                <a:cs typeface="+mn-cs"/>
-              </a:defRPr>
-            </a:lvl6pPr>
-            <a:lvl7pPr marL="2743131" algn="l" defTabSz="914377" rtl="0" eaLnBrk="1" latinLnBrk="0" hangingPunct="1">
-              <a:defRPr sz="1800" kern="1200">
-                <a:solidFill>
-                  <a:schemeClr val="lt1"/>
-                </a:solidFill>
-                <a:latin typeface="+mn-lt"/>
-                <a:ea typeface="+mn-ea"/>
-                <a:cs typeface="+mn-cs"/>
-              </a:defRPr>
-            </a:lvl7pPr>
-            <a:lvl8pPr marL="3200320" algn="l" defTabSz="914377" rtl="0" eaLnBrk="1" latinLnBrk="0" hangingPunct="1">
-              <a:defRPr sz="1800" kern="1200">
-                <a:solidFill>
-                  <a:schemeClr val="lt1"/>
-                </a:solidFill>
-                <a:latin typeface="+mn-lt"/>
-                <a:ea typeface="+mn-ea"/>
-                <a:cs typeface="+mn-cs"/>
-              </a:defRPr>
-            </a:lvl8pPr>
-            <a:lvl9pPr marL="3657509" algn="l" defTabSz="914377" rtl="0" eaLnBrk="1" latinLnBrk="0" hangingPunct="1">
-              <a:defRPr sz="1800" kern="1200">
-                <a:solidFill>
-                  <a:schemeClr val="lt1"/>
-                </a:solidFill>
-                <a:latin typeface="+mn-lt"/>
-                <a:ea typeface="+mn-ea"/>
-                <a:cs typeface="+mn-cs"/>
-              </a:defRPr>
-            </a:lvl9pPr>
-          </a:lstStyle>
-          <a:p>
-            <a:pPr algn="ctr"/>
-            <a:r>
-              <a:rPr lang="en-US" sz="1050" dirty="0" err="1">
-                <a:solidFill>
-                  <a:schemeClr val="bg1"/>
-                </a:solidFill>
-              </a:rPr>
-              <a:t>DWDrawingDefault</a:t>
-            </a:r>
-            <a:endParaRPr lang="en-US" sz="1050" dirty="0">
-              <a:solidFill>
-                <a:schemeClr val="bg1"/>
-              </a:solidFill>
-            </a:endParaRPr>
-          </a:p>
-        </p:txBody>
-      </p:sp>
-      <p:sp>
-        <p:nvSpPr>
-          <p:cNvPr id="51" name="Rounded Rectangle 11">
-            <a:extLst>
-              <a:ext uri="{FF2B5EF4-FFF2-40B4-BE49-F238E27FC236}">
-                <a16:creationId xmlns:a16="http://schemas.microsoft.com/office/drawing/2014/main" id="{9A02C670-7839-478C-8E5F-B5000F4FC315}"/>
-              </a:ext>
-            </a:extLst>
-          </p:cNvPr>
-          <p:cNvSpPr/>
-          <p:nvPr/>
-        </p:nvSpPr>
-        <p:spPr>
-          <a:xfrm>
-            <a:off x="2242809" y="1803599"/>
-            <a:ext cx="2595742" cy="288000"/>
+            <a:off x="2242808" y="1803599"/>
+            <a:ext cx="1557050" cy="288000"/>
           </a:xfrm>
           <a:prstGeom prst="roundRect">
             <a:avLst/>
@@ -10619,9 +10303,9 @@
         <p:grpSpPr>
           <a:xfrm>
             <a:off x="321535" y="4473206"/>
-            <a:ext cx="2135915" cy="276999"/>
+            <a:ext cx="2605681" cy="276999"/>
             <a:chOff x="1181100" y="4410075"/>
-            <a:chExt cx="2135915" cy="276999"/>
+            <a:chExt cx="2605681" cy="276999"/>
           </a:xfrm>
         </p:grpSpPr>
         <p:sp>
@@ -10687,8 +10371,8 @@
           </p:nvSpPr>
           <p:spPr>
             <a:xfrm>
-              <a:off x="1428751" y="4410075"/>
-              <a:ext cx="1888264" cy="276999"/>
+              <a:off x="1428750" y="4410075"/>
+              <a:ext cx="2358031" cy="276999"/>
             </a:xfrm>
             <a:prstGeom prst="rect">
               <a:avLst/>
@@ -10814,6 +10498,164 @@
           </p:txBody>
         </p:sp>
       </p:grpSp>
+      <p:sp>
+        <p:nvSpPr>
+          <p:cNvPr id="2" name="Rounded Rectangle 19">
+            <a:extLst>
+              <a:ext uri="{FF2B5EF4-FFF2-40B4-BE49-F238E27FC236}">
+                <a16:creationId xmlns:a16="http://schemas.microsoft.com/office/drawing/2014/main" id="{C849706E-7BCB-7462-B349-5F0552E72B4A}"/>
+              </a:ext>
+            </a:extLst>
+          </p:cNvPr>
+          <p:cNvSpPr/>
+          <p:nvPr/>
+        </p:nvSpPr>
+        <p:spPr>
+          <a:xfrm>
+            <a:off x="5198669" y="2209635"/>
+            <a:ext cx="1403316" cy="288000"/>
+          </a:xfrm>
+          <a:prstGeom prst="roundRect">
+            <a:avLst/>
+          </a:prstGeom>
+          <a:solidFill>
+            <a:srgbClr val="00AEC7"/>
+          </a:solidFill>
+          <a:ln>
+            <a:noFill/>
+          </a:ln>
+        </p:spPr>
+        <p:style>
+          <a:lnRef idx="2">
+            <a:schemeClr val="accent1">
+              <a:shade val="50000"/>
+            </a:schemeClr>
+          </a:lnRef>
+          <a:fillRef idx="1">
+            <a:schemeClr val="accent1"/>
+          </a:fillRef>
+          <a:effectRef idx="0">
+            <a:schemeClr val="accent1"/>
+          </a:effectRef>
+          <a:fontRef idx="minor">
+            <a:schemeClr val="lt1"/>
+          </a:fontRef>
+        </p:style>
+        <p:txBody>
+          <a:bodyPr rtlCol="0" anchor="ctr"/>
+          <a:lstStyle>
+            <a:defPPr>
+              <a:defRPr lang="en-US"/>
+            </a:defPPr>
+            <a:lvl1pPr marL="0" algn="l" defTabSz="914377" rtl="0" eaLnBrk="1" latinLnBrk="0" hangingPunct="1">
+              <a:defRPr sz="1800" kern="1200">
+                <a:solidFill>
+                  <a:schemeClr val="lt1"/>
+                </a:solidFill>
+                <a:latin typeface="+mn-lt"/>
+                <a:ea typeface="+mn-ea"/>
+                <a:cs typeface="+mn-cs"/>
+              </a:defRPr>
+            </a:lvl1pPr>
+            <a:lvl2pPr marL="457189" algn="l" defTabSz="914377" rtl="0" eaLnBrk="1" latinLnBrk="0" hangingPunct="1">
+              <a:defRPr sz="1800" kern="1200">
+                <a:solidFill>
+                  <a:schemeClr val="lt1"/>
+                </a:solidFill>
+                <a:latin typeface="+mn-lt"/>
+                <a:ea typeface="+mn-ea"/>
+                <a:cs typeface="+mn-cs"/>
+              </a:defRPr>
+            </a:lvl2pPr>
+            <a:lvl3pPr marL="914377" algn="l" defTabSz="914377" rtl="0" eaLnBrk="1" latinLnBrk="0" hangingPunct="1">
+              <a:defRPr sz="1800" kern="1200">
+                <a:solidFill>
+                  <a:schemeClr val="lt1"/>
+                </a:solidFill>
+                <a:latin typeface="+mn-lt"/>
+                <a:ea typeface="+mn-ea"/>
+                <a:cs typeface="+mn-cs"/>
+              </a:defRPr>
+            </a:lvl3pPr>
+            <a:lvl4pPr marL="1371566" algn="l" defTabSz="914377" rtl="0" eaLnBrk="1" latinLnBrk="0" hangingPunct="1">
+              <a:defRPr sz="1800" kern="1200">
+                <a:solidFill>
+                  <a:schemeClr val="lt1"/>
+                </a:solidFill>
+                <a:latin typeface="+mn-lt"/>
+                <a:ea typeface="+mn-ea"/>
+                <a:cs typeface="+mn-cs"/>
+              </a:defRPr>
+            </a:lvl4pPr>
+            <a:lvl5pPr marL="1828754" algn="l" defTabSz="914377" rtl="0" eaLnBrk="1" latinLnBrk="0" hangingPunct="1">
+              <a:defRPr sz="1800" kern="1200">
+                <a:solidFill>
+                  <a:schemeClr val="lt1"/>
+                </a:solidFill>
+                <a:latin typeface="+mn-lt"/>
+                <a:ea typeface="+mn-ea"/>
+                <a:cs typeface="+mn-cs"/>
+              </a:defRPr>
+            </a:lvl5pPr>
+            <a:lvl6pPr marL="2285943" algn="l" defTabSz="914377" rtl="0" eaLnBrk="1" latinLnBrk="0" hangingPunct="1">
+              <a:defRPr sz="1800" kern="1200">
+                <a:solidFill>
+                  <a:schemeClr val="lt1"/>
+                </a:solidFill>
+                <a:latin typeface="+mn-lt"/>
+                <a:ea typeface="+mn-ea"/>
+                <a:cs typeface="+mn-cs"/>
+              </a:defRPr>
+            </a:lvl6pPr>
+            <a:lvl7pPr marL="2743131" algn="l" defTabSz="914377" rtl="0" eaLnBrk="1" latinLnBrk="0" hangingPunct="1">
+              <a:defRPr sz="1800" kern="1200">
+                <a:solidFill>
+                  <a:schemeClr val="lt1"/>
+                </a:solidFill>
+                <a:latin typeface="+mn-lt"/>
+                <a:ea typeface="+mn-ea"/>
+                <a:cs typeface="+mn-cs"/>
+              </a:defRPr>
+            </a:lvl7pPr>
+            <a:lvl8pPr marL="3200320" algn="l" defTabSz="914377" rtl="0" eaLnBrk="1" latinLnBrk="0" hangingPunct="1">
+              <a:defRPr sz="1800" kern="1200">
+                <a:solidFill>
+                  <a:schemeClr val="lt1"/>
+                </a:solidFill>
+                <a:latin typeface="+mn-lt"/>
+                <a:ea typeface="+mn-ea"/>
+                <a:cs typeface="+mn-cs"/>
+              </a:defRPr>
+            </a:lvl8pPr>
+            <a:lvl9pPr marL="3657509" algn="l" defTabSz="914377" rtl="0" eaLnBrk="1" latinLnBrk="0" hangingPunct="1">
+              <a:defRPr sz="1800" kern="1200">
+                <a:solidFill>
+                  <a:schemeClr val="lt1"/>
+                </a:solidFill>
+                <a:latin typeface="+mn-lt"/>
+                <a:ea typeface="+mn-ea"/>
+                <a:cs typeface="+mn-cs"/>
+              </a:defRPr>
+            </a:lvl9pPr>
+          </a:lstStyle>
+          <a:p>
+            <a:pPr algn="ctr"/>
+            <a:r>
+              <a:rPr lang="en-US" sz="1200" dirty="0" err="1">
+                <a:solidFill>
+                  <a:schemeClr val="bg1"/>
+                </a:solidFill>
+              </a:rPr>
+              <a:t>UIImageDrawing</a:t>
+            </a:r>
+            <a:endParaRPr lang="en-US" sz="1200" dirty="0">
+              <a:solidFill>
+                <a:schemeClr val="bg1"/>
+              </a:solidFill>
+            </a:endParaRPr>
+          </a:p>
+        </p:txBody>
+      </p:sp>
     </p:spTree>
     <p:extLst>
       <p:ext uri="{BB962C8B-B14F-4D97-AF65-F5344CB8AC3E}">

</xml_diff>

<commit_message>
misc fix and links
</commit_message>
<xml_diff>
--- a/VEEPortingGuide/images/uiLL.pptx
+++ b/VEEPortingGuide/images/uiLL.pptx
@@ -5,7 +5,7 @@
     <p:sldMasterId id="2147483648" r:id="rId1"/>
   </p:sldMasterIdLst>
   <p:notesMasterIdLst>
-    <p:notesMasterId r:id="rId8"/>
+    <p:notesMasterId r:id="rId9"/>
   </p:notesMasterIdLst>
   <p:sldIdLst>
     <p:sldId id="257" r:id="rId2"/>
@@ -14,6 +14,7 @@
     <p:sldId id="260" r:id="rId5"/>
     <p:sldId id="261" r:id="rId6"/>
     <p:sldId id="262" r:id="rId7"/>
+    <p:sldId id="272" r:id="rId8"/>
   </p:sldIdLst>
   <p:sldSz cx="12192000" cy="6858000"/>
   <p:notesSz cx="6858000" cy="9144000"/>
@@ -202,7 +203,7 @@
           <a:p>
             <a:fld id="{F47202D6-4449-4ABC-9430-570B72DCED4F}" type="datetimeFigureOut">
               <a:rPr lang="en-US" smtClean="0"/>
-              <a:t>23/05/09</a:t>
+              <a:t>23/06/02</a:t>
             </a:fld>
             <a:endParaRPr lang="en-US"/>
           </a:p>
@@ -553,6 +554,90 @@
 </p:notes>
 </file>
 
+<file path=ppt/notesSlides/notesSlide2.xml><?xml version="1.0" encoding="utf-8"?>
+<p:notes xmlns:a="http://schemas.openxmlformats.org/drawingml/2006/main" xmlns:r="http://schemas.openxmlformats.org/officeDocument/2006/relationships" xmlns:p="http://schemas.openxmlformats.org/presentationml/2006/main">
+  <p:cSld>
+    <p:spTree>
+      <p:nvGrpSpPr>
+        <p:cNvPr id="1" name=""/>
+        <p:cNvGrpSpPr/>
+        <p:nvPr/>
+      </p:nvGrpSpPr>
+      <p:grpSpPr>
+        <a:xfrm>
+          <a:off x="0" y="0"/>
+          <a:ext cx="0" cy="0"/>
+          <a:chOff x="0" y="0"/>
+          <a:chExt cx="0" cy="0"/>
+        </a:xfrm>
+      </p:grpSpPr>
+      <p:sp>
+        <p:nvSpPr>
+          <p:cNvPr id="2" name="Slide Image Placeholder 1"/>
+          <p:cNvSpPr>
+            <a:spLocks noGrp="1" noRot="1" noChangeAspect="1"/>
+          </p:cNvSpPr>
+          <p:nvPr>
+            <p:ph type="sldImg"/>
+          </p:nvPr>
+        </p:nvSpPr>
+        <p:spPr/>
+      </p:sp>
+      <p:sp>
+        <p:nvSpPr>
+          <p:cNvPr id="3" name="Notes Placeholder 2"/>
+          <p:cNvSpPr>
+            <a:spLocks noGrp="1"/>
+          </p:cNvSpPr>
+          <p:nvPr>
+            <p:ph type="body" idx="1"/>
+          </p:nvPr>
+        </p:nvSpPr>
+        <p:spPr/>
+        <p:txBody>
+          <a:bodyPr/>
+          <a:lstStyle/>
+          <a:p>
+            <a:endParaRPr lang="en-US" dirty="0"/>
+          </a:p>
+        </p:txBody>
+      </p:sp>
+      <p:sp>
+        <p:nvSpPr>
+          <p:cNvPr id="4" name="Slide Number Placeholder 3"/>
+          <p:cNvSpPr>
+            <a:spLocks noGrp="1"/>
+          </p:cNvSpPr>
+          <p:nvPr>
+            <p:ph type="sldNum" sz="quarter" idx="5"/>
+          </p:nvPr>
+        </p:nvSpPr>
+        <p:spPr/>
+        <p:txBody>
+          <a:bodyPr/>
+          <a:lstStyle/>
+          <a:p>
+            <a:fld id="{B2471954-9953-446B-A15A-2CCA1609A68F}" type="slidenum">
+              <a:rPr lang="en-US" smtClean="0"/>
+              <a:t>7</a:t>
+            </a:fld>
+            <a:endParaRPr lang="en-US"/>
+          </a:p>
+        </p:txBody>
+      </p:sp>
+    </p:spTree>
+    <p:extLst>
+      <p:ext uri="{BB962C8B-B14F-4D97-AF65-F5344CB8AC3E}">
+        <p14:creationId xmlns:p14="http://schemas.microsoft.com/office/powerpoint/2010/main" val="4127916007"/>
+      </p:ext>
+    </p:extLst>
+  </p:cSld>
+  <p:clrMapOvr>
+    <a:masterClrMapping/>
+  </p:clrMapOvr>
+</p:notes>
+</file>
+
 <file path=ppt/slideLayouts/slideLayout1.xml><?xml version="1.0" encoding="utf-8"?>
 <p:sldLayout xmlns:a="http://schemas.openxmlformats.org/drawingml/2006/main" xmlns:r="http://schemas.openxmlformats.org/officeDocument/2006/relationships" xmlns:p="http://schemas.openxmlformats.org/presentationml/2006/main" type="title" preserve="1">
   <p:cSld name="Title Slide">
@@ -702,7 +787,7 @@
           <a:p>
             <a:fld id="{4E285625-C24A-4341-90BC-6CD71F835625}" type="datetimeFigureOut">
               <a:rPr lang="en-GB" smtClean="0"/>
-              <a:t>09/05/2023</a:t>
+              <a:t>02/06/2023</a:t>
             </a:fld>
             <a:endParaRPr lang="en-GB"/>
           </a:p>
@@ -902,7 +987,7 @@
           <a:p>
             <a:fld id="{4E285625-C24A-4341-90BC-6CD71F835625}" type="datetimeFigureOut">
               <a:rPr lang="en-GB" smtClean="0"/>
-              <a:t>09/05/2023</a:t>
+              <a:t>02/06/2023</a:t>
             </a:fld>
             <a:endParaRPr lang="en-GB"/>
           </a:p>
@@ -1112,7 +1197,7 @@
           <a:p>
             <a:fld id="{4E285625-C24A-4341-90BC-6CD71F835625}" type="datetimeFigureOut">
               <a:rPr lang="en-GB" smtClean="0"/>
-              <a:t>09/05/2023</a:t>
+              <a:t>02/06/2023</a:t>
             </a:fld>
             <a:endParaRPr lang="en-GB"/>
           </a:p>
@@ -1312,7 +1397,7 @@
           <a:p>
             <a:fld id="{4E285625-C24A-4341-90BC-6CD71F835625}" type="datetimeFigureOut">
               <a:rPr lang="en-GB" smtClean="0"/>
-              <a:t>09/05/2023</a:t>
+              <a:t>02/06/2023</a:t>
             </a:fld>
             <a:endParaRPr lang="en-GB"/>
           </a:p>
@@ -1588,7 +1673,7 @@
           <a:p>
             <a:fld id="{4E285625-C24A-4341-90BC-6CD71F835625}" type="datetimeFigureOut">
               <a:rPr lang="en-GB" smtClean="0"/>
-              <a:t>09/05/2023</a:t>
+              <a:t>02/06/2023</a:t>
             </a:fld>
             <a:endParaRPr lang="en-GB"/>
           </a:p>
@@ -1856,7 +1941,7 @@
           <a:p>
             <a:fld id="{4E285625-C24A-4341-90BC-6CD71F835625}" type="datetimeFigureOut">
               <a:rPr lang="en-GB" smtClean="0"/>
-              <a:t>09/05/2023</a:t>
+              <a:t>02/06/2023</a:t>
             </a:fld>
             <a:endParaRPr lang="en-GB"/>
           </a:p>
@@ -2271,7 +2356,7 @@
           <a:p>
             <a:fld id="{4E285625-C24A-4341-90BC-6CD71F835625}" type="datetimeFigureOut">
               <a:rPr lang="en-GB" smtClean="0"/>
-              <a:t>09/05/2023</a:t>
+              <a:t>02/06/2023</a:t>
             </a:fld>
             <a:endParaRPr lang="en-GB"/>
           </a:p>
@@ -2413,7 +2498,7 @@
           <a:p>
             <a:fld id="{4E285625-C24A-4341-90BC-6CD71F835625}" type="datetimeFigureOut">
               <a:rPr lang="en-GB" smtClean="0"/>
-              <a:t>09/05/2023</a:t>
+              <a:t>02/06/2023</a:t>
             </a:fld>
             <a:endParaRPr lang="en-GB"/>
           </a:p>
@@ -2526,7 +2611,7 @@
           <a:p>
             <a:fld id="{4E285625-C24A-4341-90BC-6CD71F835625}" type="datetimeFigureOut">
               <a:rPr lang="en-GB" smtClean="0"/>
-              <a:t>09/05/2023</a:t>
+              <a:t>02/06/2023</a:t>
             </a:fld>
             <a:endParaRPr lang="en-GB"/>
           </a:p>
@@ -2839,7 +2924,7 @@
           <a:p>
             <a:fld id="{4E285625-C24A-4341-90BC-6CD71F835625}" type="datetimeFigureOut">
               <a:rPr lang="en-GB" smtClean="0"/>
-              <a:t>09/05/2023</a:t>
+              <a:t>02/06/2023</a:t>
             </a:fld>
             <a:endParaRPr lang="en-GB"/>
           </a:p>
@@ -3128,7 +3213,7 @@
           <a:p>
             <a:fld id="{4E285625-C24A-4341-90BC-6CD71F835625}" type="datetimeFigureOut">
               <a:rPr lang="en-GB" smtClean="0"/>
-              <a:t>09/05/2023</a:t>
+              <a:t>02/06/2023</a:t>
             </a:fld>
             <a:endParaRPr lang="en-GB"/>
           </a:p>
@@ -3371,7 +3456,7 @@
           <a:p>
             <a:fld id="{4E285625-C24A-4341-90BC-6CD71F835625}" type="datetimeFigureOut">
               <a:rPr lang="en-GB" smtClean="0"/>
-              <a:t>09/05/2023</a:t>
+              <a:t>02/06/2023</a:t>
             </a:fld>
             <a:endParaRPr lang="en-GB"/>
           </a:p>
@@ -17737,7 +17822,7 @@
         <p:spPr>
           <a:xfrm>
             <a:off x="6027947" y="3769636"/>
-            <a:ext cx="1444752" cy="288000"/>
+            <a:ext cx="2995980" cy="288000"/>
           </a:xfrm>
           <a:prstGeom prst="roundRect">
             <a:avLst/>
@@ -19009,164 +19094,6 @@
                 </a:solidFill>
               </a:rPr>
               <a:t>LLUI_DISPLAY_impl.c</a:t>
-            </a:r>
-            <a:endParaRPr lang="en-US" sz="1200" dirty="0">
-              <a:solidFill>
-                <a:schemeClr val="bg1"/>
-              </a:solidFill>
-            </a:endParaRPr>
-          </a:p>
-        </p:txBody>
-      </p:sp>
-      <p:sp>
-        <p:nvSpPr>
-          <p:cNvPr id="51" name="Rounded Rectangle 19">
-            <a:extLst>
-              <a:ext uri="{FF2B5EF4-FFF2-40B4-BE49-F238E27FC236}">
-                <a16:creationId xmlns:a16="http://schemas.microsoft.com/office/drawing/2014/main" id="{951B2EFE-A5FA-4ADD-84B9-65F8AB49479C}"/>
-              </a:ext>
-            </a:extLst>
-          </p:cNvPr>
-          <p:cNvSpPr/>
-          <p:nvPr/>
-        </p:nvSpPr>
-        <p:spPr>
-          <a:xfrm>
-            <a:off x="7512400" y="3783406"/>
-            <a:ext cx="1511525" cy="288000"/>
-          </a:xfrm>
-          <a:prstGeom prst="roundRect">
-            <a:avLst/>
-          </a:prstGeom>
-          <a:solidFill>
-            <a:srgbClr val="00AEC7"/>
-          </a:solidFill>
-          <a:ln>
-            <a:noFill/>
-          </a:ln>
-        </p:spPr>
-        <p:style>
-          <a:lnRef idx="2">
-            <a:schemeClr val="accent1">
-              <a:shade val="50000"/>
-            </a:schemeClr>
-          </a:lnRef>
-          <a:fillRef idx="1">
-            <a:schemeClr val="accent1"/>
-          </a:fillRef>
-          <a:effectRef idx="0">
-            <a:schemeClr val="accent1"/>
-          </a:effectRef>
-          <a:fontRef idx="minor">
-            <a:schemeClr val="lt1"/>
-          </a:fontRef>
-        </p:style>
-        <p:txBody>
-          <a:bodyPr rtlCol="0" anchor="ctr"/>
-          <a:lstStyle>
-            <a:defPPr>
-              <a:defRPr lang="en-US"/>
-            </a:defPPr>
-            <a:lvl1pPr marL="0" algn="l" defTabSz="914377" rtl="0" eaLnBrk="1" latinLnBrk="0" hangingPunct="1">
-              <a:defRPr sz="1800" kern="1200">
-                <a:solidFill>
-                  <a:schemeClr val="lt1"/>
-                </a:solidFill>
-                <a:latin typeface="+mn-lt"/>
-                <a:ea typeface="+mn-ea"/>
-                <a:cs typeface="+mn-cs"/>
-              </a:defRPr>
-            </a:lvl1pPr>
-            <a:lvl2pPr marL="457189" algn="l" defTabSz="914377" rtl="0" eaLnBrk="1" latinLnBrk="0" hangingPunct="1">
-              <a:defRPr sz="1800" kern="1200">
-                <a:solidFill>
-                  <a:schemeClr val="lt1"/>
-                </a:solidFill>
-                <a:latin typeface="+mn-lt"/>
-                <a:ea typeface="+mn-ea"/>
-                <a:cs typeface="+mn-cs"/>
-              </a:defRPr>
-            </a:lvl2pPr>
-            <a:lvl3pPr marL="914377" algn="l" defTabSz="914377" rtl="0" eaLnBrk="1" latinLnBrk="0" hangingPunct="1">
-              <a:defRPr sz="1800" kern="1200">
-                <a:solidFill>
-                  <a:schemeClr val="lt1"/>
-                </a:solidFill>
-                <a:latin typeface="+mn-lt"/>
-                <a:ea typeface="+mn-ea"/>
-                <a:cs typeface="+mn-cs"/>
-              </a:defRPr>
-            </a:lvl3pPr>
-            <a:lvl4pPr marL="1371566" algn="l" defTabSz="914377" rtl="0" eaLnBrk="1" latinLnBrk="0" hangingPunct="1">
-              <a:defRPr sz="1800" kern="1200">
-                <a:solidFill>
-                  <a:schemeClr val="lt1"/>
-                </a:solidFill>
-                <a:latin typeface="+mn-lt"/>
-                <a:ea typeface="+mn-ea"/>
-                <a:cs typeface="+mn-cs"/>
-              </a:defRPr>
-            </a:lvl4pPr>
-            <a:lvl5pPr marL="1828754" algn="l" defTabSz="914377" rtl="0" eaLnBrk="1" latinLnBrk="0" hangingPunct="1">
-              <a:defRPr sz="1800" kern="1200">
-                <a:solidFill>
-                  <a:schemeClr val="lt1"/>
-                </a:solidFill>
-                <a:latin typeface="+mn-lt"/>
-                <a:ea typeface="+mn-ea"/>
-                <a:cs typeface="+mn-cs"/>
-              </a:defRPr>
-            </a:lvl5pPr>
-            <a:lvl6pPr marL="2285943" algn="l" defTabSz="914377" rtl="0" eaLnBrk="1" latinLnBrk="0" hangingPunct="1">
-              <a:defRPr sz="1800" kern="1200">
-                <a:solidFill>
-                  <a:schemeClr val="lt1"/>
-                </a:solidFill>
-                <a:latin typeface="+mn-lt"/>
-                <a:ea typeface="+mn-ea"/>
-                <a:cs typeface="+mn-cs"/>
-              </a:defRPr>
-            </a:lvl6pPr>
-            <a:lvl7pPr marL="2743131" algn="l" defTabSz="914377" rtl="0" eaLnBrk="1" latinLnBrk="0" hangingPunct="1">
-              <a:defRPr sz="1800" kern="1200">
-                <a:solidFill>
-                  <a:schemeClr val="lt1"/>
-                </a:solidFill>
-                <a:latin typeface="+mn-lt"/>
-                <a:ea typeface="+mn-ea"/>
-                <a:cs typeface="+mn-cs"/>
-              </a:defRPr>
-            </a:lvl7pPr>
-            <a:lvl8pPr marL="3200320" algn="l" defTabSz="914377" rtl="0" eaLnBrk="1" latinLnBrk="0" hangingPunct="1">
-              <a:defRPr sz="1800" kern="1200">
-                <a:solidFill>
-                  <a:schemeClr val="lt1"/>
-                </a:solidFill>
-                <a:latin typeface="+mn-lt"/>
-                <a:ea typeface="+mn-ea"/>
-                <a:cs typeface="+mn-cs"/>
-              </a:defRPr>
-            </a:lvl8pPr>
-            <a:lvl9pPr marL="3657509" algn="l" defTabSz="914377" rtl="0" eaLnBrk="1" latinLnBrk="0" hangingPunct="1">
-              <a:defRPr sz="1800" kern="1200">
-                <a:solidFill>
-                  <a:schemeClr val="lt1"/>
-                </a:solidFill>
-                <a:latin typeface="+mn-lt"/>
-                <a:ea typeface="+mn-ea"/>
-                <a:cs typeface="+mn-cs"/>
-              </a:defRPr>
-            </a:lvl9pPr>
-          </a:lstStyle>
-          <a:p>
-            <a:pPr algn="ctr"/>
-            <a:r>
-              <a:rPr lang="en-US" sz="1200" dirty="0" err="1">
-                <a:solidFill>
-                  <a:schemeClr val="bg1"/>
-                </a:solidFill>
-              </a:rPr>
-              <a:t>dw_drawing.h</a:t>
             </a:r>
             <a:endParaRPr lang="en-US" sz="1200" dirty="0">
               <a:solidFill>
@@ -23317,6 +23244,2961 @@
     <p:extLst>
       <p:ext uri="{BB962C8B-B14F-4D97-AF65-F5344CB8AC3E}">
         <p14:creationId xmlns:p14="http://schemas.microsoft.com/office/powerpoint/2010/main" val="856986903"/>
+      </p:ext>
+    </p:extLst>
+  </p:cSld>
+  <p:clrMapOvr>
+    <a:masterClrMapping/>
+  </p:clrMapOvr>
+</p:sld>
+</file>
+
+<file path=ppt/slides/slide7.xml><?xml version="1.0" encoding="utf-8"?>
+<p:sld xmlns:a="http://schemas.openxmlformats.org/drawingml/2006/main" xmlns:r="http://schemas.openxmlformats.org/officeDocument/2006/relationships" xmlns:p="http://schemas.openxmlformats.org/presentationml/2006/main">
+  <p:cSld>
+    <p:spTree>
+      <p:nvGrpSpPr>
+        <p:cNvPr id="1" name=""/>
+        <p:cNvGrpSpPr/>
+        <p:nvPr/>
+      </p:nvGrpSpPr>
+      <p:grpSpPr>
+        <a:xfrm>
+          <a:off x="0" y="0"/>
+          <a:ext cx="0" cy="0"/>
+          <a:chOff x="0" y="0"/>
+          <a:chExt cx="0" cy="0"/>
+        </a:xfrm>
+      </p:grpSpPr>
+      <p:grpSp>
+        <p:nvGrpSpPr>
+          <p:cNvPr id="95" name="Group 94">
+            <a:extLst>
+              <a:ext uri="{FF2B5EF4-FFF2-40B4-BE49-F238E27FC236}">
+                <a16:creationId xmlns:a16="http://schemas.microsoft.com/office/drawing/2014/main" id="{F7F2653A-8BC6-4641-FE41-90D5F5B71FB7}"/>
+              </a:ext>
+            </a:extLst>
+          </p:cNvPr>
+          <p:cNvGrpSpPr/>
+          <p:nvPr/>
+        </p:nvGrpSpPr>
+        <p:grpSpPr>
+          <a:xfrm>
+            <a:off x="168037" y="1531819"/>
+            <a:ext cx="1916922" cy="796288"/>
+            <a:chOff x="115315" y="1222701"/>
+            <a:chExt cx="1916922" cy="796288"/>
+          </a:xfrm>
+        </p:grpSpPr>
+        <p:sp>
+          <p:nvSpPr>
+            <p:cNvPr id="4" name="Rounded Rectangle 62">
+              <a:extLst>
+                <a:ext uri="{FF2B5EF4-FFF2-40B4-BE49-F238E27FC236}">
+                  <a16:creationId xmlns:a16="http://schemas.microsoft.com/office/drawing/2014/main" id="{AA9A0801-3292-173F-A4DC-91210479254F}"/>
+                </a:ext>
+              </a:extLst>
+            </p:cNvPr>
+            <p:cNvSpPr/>
+            <p:nvPr/>
+          </p:nvSpPr>
+          <p:spPr>
+            <a:xfrm>
+              <a:off x="162506" y="1459881"/>
+              <a:ext cx="1869731" cy="559108"/>
+            </a:xfrm>
+            <a:prstGeom prst="roundRect">
+              <a:avLst>
+                <a:gd name="adj" fmla="val 5059"/>
+              </a:avLst>
+            </a:prstGeom>
+            <a:solidFill>
+              <a:schemeClr val="bg1">
+                <a:lumMod val="95000"/>
+              </a:schemeClr>
+            </a:solidFill>
+            <a:ln w="19050">
+              <a:noFill/>
+            </a:ln>
+          </p:spPr>
+          <p:style>
+            <a:lnRef idx="2">
+              <a:schemeClr val="accent1">
+                <a:shade val="50000"/>
+              </a:schemeClr>
+            </a:lnRef>
+            <a:fillRef idx="1">
+              <a:schemeClr val="accent1"/>
+            </a:fillRef>
+            <a:effectRef idx="0">
+              <a:schemeClr val="accent1"/>
+            </a:effectRef>
+            <a:fontRef idx="minor">
+              <a:schemeClr val="lt1"/>
+            </a:fontRef>
+          </p:style>
+          <p:txBody>
+            <a:bodyPr wrap="square" lIns="0" tIns="0" rIns="0" bIns="0" rtlCol="0" anchor="ctr"/>
+            <a:lstStyle/>
+            <a:p>
+              <a:pPr algn="ctr"/>
+              <a:endParaRPr lang="en-US" sz="1200" dirty="0">
+                <a:solidFill>
+                  <a:schemeClr val="bg1">
+                    <a:lumMod val="95000"/>
+                  </a:schemeClr>
+                </a:solidFill>
+              </a:endParaRPr>
+            </a:p>
+          </p:txBody>
+        </p:sp>
+        <p:sp>
+          <p:nvSpPr>
+            <p:cNvPr id="8" name="Rectangle 7">
+              <a:extLst>
+                <a:ext uri="{FF2B5EF4-FFF2-40B4-BE49-F238E27FC236}">
+                  <a16:creationId xmlns:a16="http://schemas.microsoft.com/office/drawing/2014/main" id="{B374F2E0-535C-6203-02BE-B5A30F957759}"/>
+                </a:ext>
+              </a:extLst>
+            </p:cNvPr>
+            <p:cNvSpPr/>
+            <p:nvPr/>
+          </p:nvSpPr>
+          <p:spPr>
+            <a:xfrm>
+              <a:off x="115315" y="1222701"/>
+              <a:ext cx="644600" cy="276999"/>
+            </a:xfrm>
+            <a:prstGeom prst="rect">
+              <a:avLst/>
+            </a:prstGeom>
+          </p:spPr>
+          <p:txBody>
+            <a:bodyPr wrap="none">
+              <a:spAutoFit/>
+            </a:bodyPr>
+            <a:lstStyle/>
+            <a:p>
+              <a:r>
+                <a:rPr lang="en-US" sz="1200" dirty="0"/>
+                <a:t>UI Pack</a:t>
+              </a:r>
+            </a:p>
+          </p:txBody>
+        </p:sp>
+        <p:sp>
+          <p:nvSpPr>
+            <p:cNvPr id="11" name="Rounded Rectangle 17">
+              <a:extLst>
+                <a:ext uri="{FF2B5EF4-FFF2-40B4-BE49-F238E27FC236}">
+                  <a16:creationId xmlns:a16="http://schemas.microsoft.com/office/drawing/2014/main" id="{F7BBB758-4A60-BB52-EBC7-D2B690B3F058}"/>
+                </a:ext>
+              </a:extLst>
+            </p:cNvPr>
+            <p:cNvSpPr/>
+            <p:nvPr/>
+          </p:nvSpPr>
+          <p:spPr>
+            <a:xfrm>
+              <a:off x="291036" y="1607847"/>
+              <a:ext cx="1645920" cy="288000"/>
+            </a:xfrm>
+            <a:prstGeom prst="roundRect">
+              <a:avLst/>
+            </a:prstGeom>
+            <a:solidFill>
+              <a:srgbClr val="6CC24A"/>
+            </a:solidFill>
+            <a:ln>
+              <a:noFill/>
+            </a:ln>
+          </p:spPr>
+          <p:style>
+            <a:lnRef idx="2">
+              <a:schemeClr val="accent1">
+                <a:shade val="50000"/>
+              </a:schemeClr>
+            </a:lnRef>
+            <a:fillRef idx="1">
+              <a:schemeClr val="accent1"/>
+            </a:fillRef>
+            <a:effectRef idx="0">
+              <a:schemeClr val="accent1"/>
+            </a:effectRef>
+            <a:fontRef idx="minor">
+              <a:schemeClr val="lt1"/>
+            </a:fontRef>
+          </p:style>
+          <p:txBody>
+            <a:bodyPr rtlCol="0" anchor="ctr"/>
+            <a:lstStyle>
+              <a:defPPr>
+                <a:defRPr lang="en-US"/>
+              </a:defPPr>
+              <a:lvl1pPr marL="0" algn="l" defTabSz="914377" rtl="0" eaLnBrk="1" latinLnBrk="0" hangingPunct="1">
+                <a:defRPr sz="1800" kern="1200">
+                  <a:solidFill>
+                    <a:schemeClr val="lt1"/>
+                  </a:solidFill>
+                  <a:latin typeface="+mn-lt"/>
+                  <a:ea typeface="+mn-ea"/>
+                  <a:cs typeface="+mn-cs"/>
+                </a:defRPr>
+              </a:lvl1pPr>
+              <a:lvl2pPr marL="457189" algn="l" defTabSz="914377" rtl="0" eaLnBrk="1" latinLnBrk="0" hangingPunct="1">
+                <a:defRPr sz="1800" kern="1200">
+                  <a:solidFill>
+                    <a:schemeClr val="lt1"/>
+                  </a:solidFill>
+                  <a:latin typeface="+mn-lt"/>
+                  <a:ea typeface="+mn-ea"/>
+                  <a:cs typeface="+mn-cs"/>
+                </a:defRPr>
+              </a:lvl2pPr>
+              <a:lvl3pPr marL="914377" algn="l" defTabSz="914377" rtl="0" eaLnBrk="1" latinLnBrk="0" hangingPunct="1">
+                <a:defRPr sz="1800" kern="1200">
+                  <a:solidFill>
+                    <a:schemeClr val="lt1"/>
+                  </a:solidFill>
+                  <a:latin typeface="+mn-lt"/>
+                  <a:ea typeface="+mn-ea"/>
+                  <a:cs typeface="+mn-cs"/>
+                </a:defRPr>
+              </a:lvl3pPr>
+              <a:lvl4pPr marL="1371566" algn="l" defTabSz="914377" rtl="0" eaLnBrk="1" latinLnBrk="0" hangingPunct="1">
+                <a:defRPr sz="1800" kern="1200">
+                  <a:solidFill>
+                    <a:schemeClr val="lt1"/>
+                  </a:solidFill>
+                  <a:latin typeface="+mn-lt"/>
+                  <a:ea typeface="+mn-ea"/>
+                  <a:cs typeface="+mn-cs"/>
+                </a:defRPr>
+              </a:lvl4pPr>
+              <a:lvl5pPr marL="1828754" algn="l" defTabSz="914377" rtl="0" eaLnBrk="1" latinLnBrk="0" hangingPunct="1">
+                <a:defRPr sz="1800" kern="1200">
+                  <a:solidFill>
+                    <a:schemeClr val="lt1"/>
+                  </a:solidFill>
+                  <a:latin typeface="+mn-lt"/>
+                  <a:ea typeface="+mn-ea"/>
+                  <a:cs typeface="+mn-cs"/>
+                </a:defRPr>
+              </a:lvl5pPr>
+              <a:lvl6pPr marL="2285943" algn="l" defTabSz="914377" rtl="0" eaLnBrk="1" latinLnBrk="0" hangingPunct="1">
+                <a:defRPr sz="1800" kern="1200">
+                  <a:solidFill>
+                    <a:schemeClr val="lt1"/>
+                  </a:solidFill>
+                  <a:latin typeface="+mn-lt"/>
+                  <a:ea typeface="+mn-ea"/>
+                  <a:cs typeface="+mn-cs"/>
+                </a:defRPr>
+              </a:lvl6pPr>
+              <a:lvl7pPr marL="2743131" algn="l" defTabSz="914377" rtl="0" eaLnBrk="1" latinLnBrk="0" hangingPunct="1">
+                <a:defRPr sz="1800" kern="1200">
+                  <a:solidFill>
+                    <a:schemeClr val="lt1"/>
+                  </a:solidFill>
+                  <a:latin typeface="+mn-lt"/>
+                  <a:ea typeface="+mn-ea"/>
+                  <a:cs typeface="+mn-cs"/>
+                </a:defRPr>
+              </a:lvl7pPr>
+              <a:lvl8pPr marL="3200320" algn="l" defTabSz="914377" rtl="0" eaLnBrk="1" latinLnBrk="0" hangingPunct="1">
+                <a:defRPr sz="1800" kern="1200">
+                  <a:solidFill>
+                    <a:schemeClr val="lt1"/>
+                  </a:solidFill>
+                  <a:latin typeface="+mn-lt"/>
+                  <a:ea typeface="+mn-ea"/>
+                  <a:cs typeface="+mn-cs"/>
+                </a:defRPr>
+              </a:lvl8pPr>
+              <a:lvl9pPr marL="3657509" algn="l" defTabSz="914377" rtl="0" eaLnBrk="1" latinLnBrk="0" hangingPunct="1">
+                <a:defRPr sz="1800" kern="1200">
+                  <a:solidFill>
+                    <a:schemeClr val="lt1"/>
+                  </a:solidFill>
+                  <a:latin typeface="+mn-lt"/>
+                  <a:ea typeface="+mn-ea"/>
+                  <a:cs typeface="+mn-cs"/>
+                </a:defRPr>
+              </a:lvl9pPr>
+            </a:lstStyle>
+            <a:p>
+              <a:pPr algn="ctr"/>
+              <a:r>
+                <a:rPr lang="en-US" sz="1200" dirty="0" err="1">
+                  <a:solidFill>
+                    <a:schemeClr val="bg1"/>
+                  </a:solidFill>
+                </a:rPr>
+                <a:t>LLUI_PAINTER_impl.h</a:t>
+              </a:r>
+              <a:endParaRPr lang="en-US" sz="1200" dirty="0">
+                <a:solidFill>
+                  <a:schemeClr val="bg1"/>
+                </a:solidFill>
+              </a:endParaRPr>
+            </a:p>
+          </p:txBody>
+        </p:sp>
+      </p:grpSp>
+      <p:sp>
+        <p:nvSpPr>
+          <p:cNvPr id="2" name="Rounded Rectangle 62">
+            <a:extLst>
+              <a:ext uri="{FF2B5EF4-FFF2-40B4-BE49-F238E27FC236}">
+                <a16:creationId xmlns:a16="http://schemas.microsoft.com/office/drawing/2014/main" id="{00F79921-C7DD-622C-A23E-14467ADCB5C7}"/>
+              </a:ext>
+            </a:extLst>
+          </p:cNvPr>
+          <p:cNvSpPr/>
+          <p:nvPr/>
+        </p:nvSpPr>
+        <p:spPr>
+          <a:xfrm>
+            <a:off x="2552661" y="1825429"/>
+            <a:ext cx="1887202" cy="1251078"/>
+          </a:xfrm>
+          <a:prstGeom prst="roundRect">
+            <a:avLst>
+              <a:gd name="adj" fmla="val 5059"/>
+            </a:avLst>
+          </a:prstGeom>
+          <a:solidFill>
+            <a:schemeClr val="bg1">
+              <a:lumMod val="95000"/>
+            </a:schemeClr>
+          </a:solidFill>
+          <a:ln w="19050">
+            <a:solidFill>
+              <a:schemeClr val="tx2"/>
+            </a:solidFill>
+          </a:ln>
+        </p:spPr>
+        <p:style>
+          <a:lnRef idx="2">
+            <a:schemeClr val="accent1">
+              <a:shade val="50000"/>
+            </a:schemeClr>
+          </a:lnRef>
+          <a:fillRef idx="1">
+            <a:schemeClr val="accent1"/>
+          </a:fillRef>
+          <a:effectRef idx="0">
+            <a:schemeClr val="accent1"/>
+          </a:effectRef>
+          <a:fontRef idx="minor">
+            <a:schemeClr val="lt1"/>
+          </a:fontRef>
+        </p:style>
+        <p:txBody>
+          <a:bodyPr wrap="square" lIns="0" tIns="0" rIns="0" bIns="0" rtlCol="0" anchor="ctr"/>
+          <a:lstStyle/>
+          <a:p>
+            <a:pPr algn="ctr"/>
+            <a:endParaRPr lang="en-US" sz="1200" dirty="0">
+              <a:solidFill>
+                <a:schemeClr val="bg1">
+                  <a:lumMod val="95000"/>
+                </a:schemeClr>
+              </a:solidFill>
+            </a:endParaRPr>
+          </a:p>
+        </p:txBody>
+      </p:sp>
+      <p:sp>
+        <p:nvSpPr>
+          <p:cNvPr id="3" name="Rectangle 2">
+            <a:extLst>
+              <a:ext uri="{FF2B5EF4-FFF2-40B4-BE49-F238E27FC236}">
+                <a16:creationId xmlns:a16="http://schemas.microsoft.com/office/drawing/2014/main" id="{1B2FEDF8-A44D-6CF8-64E2-E59650CCDB66}"/>
+              </a:ext>
+            </a:extLst>
+          </p:cNvPr>
+          <p:cNvSpPr/>
+          <p:nvPr/>
+        </p:nvSpPr>
+        <p:spPr>
+          <a:xfrm>
+            <a:off x="2548003" y="1521213"/>
+            <a:ext cx="1325106" cy="276999"/>
+          </a:xfrm>
+          <a:prstGeom prst="rect">
+            <a:avLst/>
+          </a:prstGeom>
+        </p:spPr>
+        <p:txBody>
+          <a:bodyPr wrap="none">
+            <a:spAutoFit/>
+          </a:bodyPr>
+          <a:lstStyle/>
+          <a:p>
+            <a:r>
+              <a:rPr lang="en-US" sz="1200" dirty="0"/>
+              <a:t>C Module </a:t>
+            </a:r>
+            <a:r>
+              <a:rPr lang="en-US" sz="1200" dirty="0" err="1"/>
+              <a:t>MicroUI</a:t>
+            </a:r>
+            <a:endParaRPr lang="en-US" sz="1200" dirty="0"/>
+          </a:p>
+        </p:txBody>
+      </p:sp>
+      <p:sp>
+        <p:nvSpPr>
+          <p:cNvPr id="5" name="Rounded Rectangle 29">
+            <a:extLst>
+              <a:ext uri="{FF2B5EF4-FFF2-40B4-BE49-F238E27FC236}">
+                <a16:creationId xmlns:a16="http://schemas.microsoft.com/office/drawing/2014/main" id="{25B4B334-91FC-F5BC-F42B-3C8E95A38B2F}"/>
+              </a:ext>
+            </a:extLst>
+          </p:cNvPr>
+          <p:cNvSpPr/>
+          <p:nvPr/>
+        </p:nvSpPr>
+        <p:spPr>
+          <a:xfrm>
+            <a:off x="2673302" y="1912067"/>
+            <a:ext cx="1645920" cy="288000"/>
+          </a:xfrm>
+          <a:prstGeom prst="roundRect">
+            <a:avLst/>
+          </a:prstGeom>
+          <a:solidFill>
+            <a:srgbClr val="00AEC7"/>
+          </a:solidFill>
+          <a:ln>
+            <a:noFill/>
+          </a:ln>
+        </p:spPr>
+        <p:style>
+          <a:lnRef idx="2">
+            <a:schemeClr val="accent1">
+              <a:shade val="50000"/>
+            </a:schemeClr>
+          </a:lnRef>
+          <a:fillRef idx="1">
+            <a:schemeClr val="accent1"/>
+          </a:fillRef>
+          <a:effectRef idx="0">
+            <a:schemeClr val="accent1"/>
+          </a:effectRef>
+          <a:fontRef idx="minor">
+            <a:schemeClr val="lt1"/>
+          </a:fontRef>
+        </p:style>
+        <p:txBody>
+          <a:bodyPr rtlCol="0" anchor="ctr"/>
+          <a:lstStyle>
+            <a:defPPr>
+              <a:defRPr lang="en-US"/>
+            </a:defPPr>
+            <a:lvl1pPr marL="0" algn="l" defTabSz="914377" rtl="0" eaLnBrk="1" latinLnBrk="0" hangingPunct="1">
+              <a:defRPr sz="1800" kern="1200">
+                <a:solidFill>
+                  <a:schemeClr val="lt1"/>
+                </a:solidFill>
+                <a:latin typeface="+mn-lt"/>
+                <a:ea typeface="+mn-ea"/>
+                <a:cs typeface="+mn-cs"/>
+              </a:defRPr>
+            </a:lvl1pPr>
+            <a:lvl2pPr marL="457189" algn="l" defTabSz="914377" rtl="0" eaLnBrk="1" latinLnBrk="0" hangingPunct="1">
+              <a:defRPr sz="1800" kern="1200">
+                <a:solidFill>
+                  <a:schemeClr val="lt1"/>
+                </a:solidFill>
+                <a:latin typeface="+mn-lt"/>
+                <a:ea typeface="+mn-ea"/>
+                <a:cs typeface="+mn-cs"/>
+              </a:defRPr>
+            </a:lvl2pPr>
+            <a:lvl3pPr marL="914377" algn="l" defTabSz="914377" rtl="0" eaLnBrk="1" latinLnBrk="0" hangingPunct="1">
+              <a:defRPr sz="1800" kern="1200">
+                <a:solidFill>
+                  <a:schemeClr val="lt1"/>
+                </a:solidFill>
+                <a:latin typeface="+mn-lt"/>
+                <a:ea typeface="+mn-ea"/>
+                <a:cs typeface="+mn-cs"/>
+              </a:defRPr>
+            </a:lvl3pPr>
+            <a:lvl4pPr marL="1371566" algn="l" defTabSz="914377" rtl="0" eaLnBrk="1" latinLnBrk="0" hangingPunct="1">
+              <a:defRPr sz="1800" kern="1200">
+                <a:solidFill>
+                  <a:schemeClr val="lt1"/>
+                </a:solidFill>
+                <a:latin typeface="+mn-lt"/>
+                <a:ea typeface="+mn-ea"/>
+                <a:cs typeface="+mn-cs"/>
+              </a:defRPr>
+            </a:lvl4pPr>
+            <a:lvl5pPr marL="1828754" algn="l" defTabSz="914377" rtl="0" eaLnBrk="1" latinLnBrk="0" hangingPunct="1">
+              <a:defRPr sz="1800" kern="1200">
+                <a:solidFill>
+                  <a:schemeClr val="lt1"/>
+                </a:solidFill>
+                <a:latin typeface="+mn-lt"/>
+                <a:ea typeface="+mn-ea"/>
+                <a:cs typeface="+mn-cs"/>
+              </a:defRPr>
+            </a:lvl5pPr>
+            <a:lvl6pPr marL="2285943" algn="l" defTabSz="914377" rtl="0" eaLnBrk="1" latinLnBrk="0" hangingPunct="1">
+              <a:defRPr sz="1800" kern="1200">
+                <a:solidFill>
+                  <a:schemeClr val="lt1"/>
+                </a:solidFill>
+                <a:latin typeface="+mn-lt"/>
+                <a:ea typeface="+mn-ea"/>
+                <a:cs typeface="+mn-cs"/>
+              </a:defRPr>
+            </a:lvl6pPr>
+            <a:lvl7pPr marL="2743131" algn="l" defTabSz="914377" rtl="0" eaLnBrk="1" latinLnBrk="0" hangingPunct="1">
+              <a:defRPr sz="1800" kern="1200">
+                <a:solidFill>
+                  <a:schemeClr val="lt1"/>
+                </a:solidFill>
+                <a:latin typeface="+mn-lt"/>
+                <a:ea typeface="+mn-ea"/>
+                <a:cs typeface="+mn-cs"/>
+              </a:defRPr>
+            </a:lvl7pPr>
+            <a:lvl8pPr marL="3200320" algn="l" defTabSz="914377" rtl="0" eaLnBrk="1" latinLnBrk="0" hangingPunct="1">
+              <a:defRPr sz="1800" kern="1200">
+                <a:solidFill>
+                  <a:schemeClr val="lt1"/>
+                </a:solidFill>
+                <a:latin typeface="+mn-lt"/>
+                <a:ea typeface="+mn-ea"/>
+                <a:cs typeface="+mn-cs"/>
+              </a:defRPr>
+            </a:lvl8pPr>
+            <a:lvl9pPr marL="3657509" algn="l" defTabSz="914377" rtl="0" eaLnBrk="1" latinLnBrk="0" hangingPunct="1">
+              <a:defRPr sz="1800" kern="1200">
+                <a:solidFill>
+                  <a:schemeClr val="lt1"/>
+                </a:solidFill>
+                <a:latin typeface="+mn-lt"/>
+                <a:ea typeface="+mn-ea"/>
+                <a:cs typeface="+mn-cs"/>
+              </a:defRPr>
+            </a:lvl9pPr>
+          </a:lstStyle>
+          <a:p>
+            <a:pPr algn="ctr"/>
+            <a:r>
+              <a:rPr lang="en-US" sz="1200" dirty="0" err="1">
+                <a:solidFill>
+                  <a:schemeClr val="bg1"/>
+                </a:solidFill>
+              </a:rPr>
+              <a:t>LLUI_PAINTER_impl.c</a:t>
+            </a:r>
+            <a:endParaRPr lang="en-US" sz="1200" dirty="0">
+              <a:solidFill>
+                <a:schemeClr val="bg1"/>
+              </a:solidFill>
+            </a:endParaRPr>
+          </a:p>
+        </p:txBody>
+      </p:sp>
+      <p:cxnSp>
+        <p:nvCxnSpPr>
+          <p:cNvPr id="32" name="Straight Arrow Connector 31">
+            <a:extLst>
+              <a:ext uri="{FF2B5EF4-FFF2-40B4-BE49-F238E27FC236}">
+                <a16:creationId xmlns:a16="http://schemas.microsoft.com/office/drawing/2014/main" id="{312DA880-82E9-D4F9-A51C-447B572C9CE5}"/>
+              </a:ext>
+            </a:extLst>
+          </p:cNvPr>
+          <p:cNvCxnSpPr>
+            <a:cxnSpLocks/>
+            <a:stCxn id="5" idx="1"/>
+            <a:endCxn id="11" idx="3"/>
+          </p:cNvCxnSpPr>
+          <p:nvPr/>
+        </p:nvCxnSpPr>
+        <p:spPr>
+          <a:xfrm flipH="1">
+            <a:off x="1989678" y="2056067"/>
+            <a:ext cx="683624" cy="4898"/>
+          </a:xfrm>
+          <a:prstGeom prst="straightConnector1">
+            <a:avLst/>
+          </a:prstGeom>
+          <a:ln>
+            <a:tailEnd type="triangle"/>
+          </a:ln>
+        </p:spPr>
+        <p:style>
+          <a:lnRef idx="1">
+            <a:schemeClr val="accent1"/>
+          </a:lnRef>
+          <a:fillRef idx="0">
+            <a:schemeClr val="accent1"/>
+          </a:fillRef>
+          <a:effectRef idx="0">
+            <a:schemeClr val="accent1"/>
+          </a:effectRef>
+          <a:fontRef idx="minor">
+            <a:schemeClr val="tx1"/>
+          </a:fontRef>
+        </p:style>
+      </p:cxnSp>
+      <p:sp>
+        <p:nvSpPr>
+          <p:cNvPr id="17" name="Rounded Rectangle 62">
+            <a:extLst>
+              <a:ext uri="{FF2B5EF4-FFF2-40B4-BE49-F238E27FC236}">
+                <a16:creationId xmlns:a16="http://schemas.microsoft.com/office/drawing/2014/main" id="{E7D45980-4DB5-9A2A-61F8-A9F201B7CA9B}"/>
+              </a:ext>
+            </a:extLst>
+          </p:cNvPr>
+          <p:cNvSpPr/>
+          <p:nvPr/>
+        </p:nvSpPr>
+        <p:spPr>
+          <a:xfrm>
+            <a:off x="5055568" y="2880659"/>
+            <a:ext cx="1861683" cy="1273820"/>
+          </a:xfrm>
+          <a:prstGeom prst="roundRect">
+            <a:avLst>
+              <a:gd name="adj" fmla="val 5059"/>
+            </a:avLst>
+          </a:prstGeom>
+          <a:solidFill>
+            <a:schemeClr val="bg1">
+              <a:lumMod val="95000"/>
+            </a:schemeClr>
+          </a:solidFill>
+          <a:ln w="19050">
+            <a:solidFill>
+              <a:schemeClr val="tx2"/>
+            </a:solidFill>
+          </a:ln>
+        </p:spPr>
+        <p:style>
+          <a:lnRef idx="2">
+            <a:schemeClr val="accent1">
+              <a:shade val="50000"/>
+            </a:schemeClr>
+          </a:lnRef>
+          <a:fillRef idx="1">
+            <a:schemeClr val="accent1"/>
+          </a:fillRef>
+          <a:effectRef idx="0">
+            <a:schemeClr val="accent1"/>
+          </a:effectRef>
+          <a:fontRef idx="minor">
+            <a:schemeClr val="lt1"/>
+          </a:fontRef>
+        </p:style>
+        <p:txBody>
+          <a:bodyPr wrap="square" lIns="0" tIns="0" rIns="0" bIns="0" rtlCol="0" anchor="ctr"/>
+          <a:lstStyle/>
+          <a:p>
+            <a:pPr algn="ctr"/>
+            <a:endParaRPr lang="en-US" sz="1200" dirty="0">
+              <a:solidFill>
+                <a:schemeClr val="bg1">
+                  <a:lumMod val="95000"/>
+                </a:schemeClr>
+              </a:solidFill>
+            </a:endParaRPr>
+          </a:p>
+        </p:txBody>
+      </p:sp>
+      <p:sp>
+        <p:nvSpPr>
+          <p:cNvPr id="9" name="Rectangle 8">
+            <a:extLst>
+              <a:ext uri="{FF2B5EF4-FFF2-40B4-BE49-F238E27FC236}">
+                <a16:creationId xmlns:a16="http://schemas.microsoft.com/office/drawing/2014/main" id="{F73A66E6-715A-15CD-62D7-CC26C81ADF1D}"/>
+              </a:ext>
+            </a:extLst>
+          </p:cNvPr>
+          <p:cNvSpPr/>
+          <p:nvPr/>
+        </p:nvSpPr>
+        <p:spPr>
+          <a:xfrm>
+            <a:off x="5055568" y="2622705"/>
+            <a:ext cx="2296168" cy="276999"/>
+          </a:xfrm>
+          <a:prstGeom prst="rect">
+            <a:avLst/>
+          </a:prstGeom>
+        </p:spPr>
+        <p:txBody>
+          <a:bodyPr wrap="square">
+            <a:spAutoFit/>
+          </a:bodyPr>
+          <a:lstStyle/>
+          <a:p>
+            <a:r>
+              <a:rPr lang="en-US" sz="1200" dirty="0"/>
+              <a:t>C Module </a:t>
+            </a:r>
+            <a:r>
+              <a:rPr lang="en-US" sz="1200" dirty="0" err="1"/>
+              <a:t>MicroUI-VGLite</a:t>
+            </a:r>
+            <a:endParaRPr lang="en-US" sz="1200" dirty="0"/>
+          </a:p>
+        </p:txBody>
+      </p:sp>
+      <p:sp>
+        <p:nvSpPr>
+          <p:cNvPr id="16" name="Rounded Rectangle 29">
+            <a:extLst>
+              <a:ext uri="{FF2B5EF4-FFF2-40B4-BE49-F238E27FC236}">
+                <a16:creationId xmlns:a16="http://schemas.microsoft.com/office/drawing/2014/main" id="{85A1D995-378C-A69A-2510-ACCD588350BC}"/>
+              </a:ext>
+            </a:extLst>
+          </p:cNvPr>
+          <p:cNvSpPr/>
+          <p:nvPr/>
+        </p:nvSpPr>
+        <p:spPr>
+          <a:xfrm>
+            <a:off x="5139479" y="2995109"/>
+            <a:ext cx="1645920" cy="288000"/>
+          </a:xfrm>
+          <a:prstGeom prst="roundRect">
+            <a:avLst/>
+          </a:prstGeom>
+          <a:solidFill>
+            <a:srgbClr val="00AEC7"/>
+          </a:solidFill>
+          <a:ln>
+            <a:noFill/>
+          </a:ln>
+        </p:spPr>
+        <p:style>
+          <a:lnRef idx="2">
+            <a:schemeClr val="accent1">
+              <a:shade val="50000"/>
+            </a:schemeClr>
+          </a:lnRef>
+          <a:fillRef idx="1">
+            <a:schemeClr val="accent1"/>
+          </a:fillRef>
+          <a:effectRef idx="0">
+            <a:schemeClr val="accent1"/>
+          </a:effectRef>
+          <a:fontRef idx="minor">
+            <a:schemeClr val="lt1"/>
+          </a:fontRef>
+        </p:style>
+        <p:txBody>
+          <a:bodyPr rtlCol="0" anchor="ctr"/>
+          <a:lstStyle>
+            <a:defPPr>
+              <a:defRPr lang="en-US"/>
+            </a:defPPr>
+            <a:lvl1pPr marL="0" algn="l" defTabSz="914377" rtl="0" eaLnBrk="1" latinLnBrk="0" hangingPunct="1">
+              <a:defRPr sz="1800" kern="1200">
+                <a:solidFill>
+                  <a:schemeClr val="lt1"/>
+                </a:solidFill>
+                <a:latin typeface="+mn-lt"/>
+                <a:ea typeface="+mn-ea"/>
+                <a:cs typeface="+mn-cs"/>
+              </a:defRPr>
+            </a:lvl1pPr>
+            <a:lvl2pPr marL="457189" algn="l" defTabSz="914377" rtl="0" eaLnBrk="1" latinLnBrk="0" hangingPunct="1">
+              <a:defRPr sz="1800" kern="1200">
+                <a:solidFill>
+                  <a:schemeClr val="lt1"/>
+                </a:solidFill>
+                <a:latin typeface="+mn-lt"/>
+                <a:ea typeface="+mn-ea"/>
+                <a:cs typeface="+mn-cs"/>
+              </a:defRPr>
+            </a:lvl2pPr>
+            <a:lvl3pPr marL="914377" algn="l" defTabSz="914377" rtl="0" eaLnBrk="1" latinLnBrk="0" hangingPunct="1">
+              <a:defRPr sz="1800" kern="1200">
+                <a:solidFill>
+                  <a:schemeClr val="lt1"/>
+                </a:solidFill>
+                <a:latin typeface="+mn-lt"/>
+                <a:ea typeface="+mn-ea"/>
+                <a:cs typeface="+mn-cs"/>
+              </a:defRPr>
+            </a:lvl3pPr>
+            <a:lvl4pPr marL="1371566" algn="l" defTabSz="914377" rtl="0" eaLnBrk="1" latinLnBrk="0" hangingPunct="1">
+              <a:defRPr sz="1800" kern="1200">
+                <a:solidFill>
+                  <a:schemeClr val="lt1"/>
+                </a:solidFill>
+                <a:latin typeface="+mn-lt"/>
+                <a:ea typeface="+mn-ea"/>
+                <a:cs typeface="+mn-cs"/>
+              </a:defRPr>
+            </a:lvl4pPr>
+            <a:lvl5pPr marL="1828754" algn="l" defTabSz="914377" rtl="0" eaLnBrk="1" latinLnBrk="0" hangingPunct="1">
+              <a:defRPr sz="1800" kern="1200">
+                <a:solidFill>
+                  <a:schemeClr val="lt1"/>
+                </a:solidFill>
+                <a:latin typeface="+mn-lt"/>
+                <a:ea typeface="+mn-ea"/>
+                <a:cs typeface="+mn-cs"/>
+              </a:defRPr>
+            </a:lvl5pPr>
+            <a:lvl6pPr marL="2285943" algn="l" defTabSz="914377" rtl="0" eaLnBrk="1" latinLnBrk="0" hangingPunct="1">
+              <a:defRPr sz="1800" kern="1200">
+                <a:solidFill>
+                  <a:schemeClr val="lt1"/>
+                </a:solidFill>
+                <a:latin typeface="+mn-lt"/>
+                <a:ea typeface="+mn-ea"/>
+                <a:cs typeface="+mn-cs"/>
+              </a:defRPr>
+            </a:lvl6pPr>
+            <a:lvl7pPr marL="2743131" algn="l" defTabSz="914377" rtl="0" eaLnBrk="1" latinLnBrk="0" hangingPunct="1">
+              <a:defRPr sz="1800" kern="1200">
+                <a:solidFill>
+                  <a:schemeClr val="lt1"/>
+                </a:solidFill>
+                <a:latin typeface="+mn-lt"/>
+                <a:ea typeface="+mn-ea"/>
+                <a:cs typeface="+mn-cs"/>
+              </a:defRPr>
+            </a:lvl7pPr>
+            <a:lvl8pPr marL="3200320" algn="l" defTabSz="914377" rtl="0" eaLnBrk="1" latinLnBrk="0" hangingPunct="1">
+              <a:defRPr sz="1800" kern="1200">
+                <a:solidFill>
+                  <a:schemeClr val="lt1"/>
+                </a:solidFill>
+                <a:latin typeface="+mn-lt"/>
+                <a:ea typeface="+mn-ea"/>
+                <a:cs typeface="+mn-cs"/>
+              </a:defRPr>
+            </a:lvl8pPr>
+            <a:lvl9pPr marL="3657509" algn="l" defTabSz="914377" rtl="0" eaLnBrk="1" latinLnBrk="0" hangingPunct="1">
+              <a:defRPr sz="1800" kern="1200">
+                <a:solidFill>
+                  <a:schemeClr val="lt1"/>
+                </a:solidFill>
+                <a:latin typeface="+mn-lt"/>
+                <a:ea typeface="+mn-ea"/>
+                <a:cs typeface="+mn-cs"/>
+              </a:defRPr>
+            </a:lvl9pPr>
+          </a:lstStyle>
+          <a:p>
+            <a:pPr algn="ctr"/>
+            <a:r>
+              <a:rPr lang="en-US" sz="1200" dirty="0" err="1">
+                <a:solidFill>
+                  <a:schemeClr val="bg1"/>
+                </a:solidFill>
+              </a:rPr>
+              <a:t>ui_drawing_vglite.c</a:t>
+            </a:r>
+            <a:endParaRPr lang="en-US" sz="1200" dirty="0">
+              <a:solidFill>
+                <a:schemeClr val="bg1"/>
+              </a:solidFill>
+            </a:endParaRPr>
+          </a:p>
+        </p:txBody>
+      </p:sp>
+      <p:sp>
+        <p:nvSpPr>
+          <p:cNvPr id="7" name="Rounded Rectangle 29">
+            <a:extLst>
+              <a:ext uri="{FF2B5EF4-FFF2-40B4-BE49-F238E27FC236}">
+                <a16:creationId xmlns:a16="http://schemas.microsoft.com/office/drawing/2014/main" id="{52B0C09E-03A3-195B-108C-9AD23AF3EAB8}"/>
+              </a:ext>
+            </a:extLst>
+          </p:cNvPr>
+          <p:cNvSpPr/>
+          <p:nvPr/>
+        </p:nvSpPr>
+        <p:spPr>
+          <a:xfrm>
+            <a:off x="5139479" y="3368422"/>
+            <a:ext cx="1645920" cy="288000"/>
+          </a:xfrm>
+          <a:prstGeom prst="roundRect">
+            <a:avLst/>
+          </a:prstGeom>
+          <a:solidFill>
+            <a:srgbClr val="00AEC7"/>
+          </a:solidFill>
+          <a:ln>
+            <a:noFill/>
+          </a:ln>
+        </p:spPr>
+        <p:style>
+          <a:lnRef idx="2">
+            <a:schemeClr val="accent1">
+              <a:shade val="50000"/>
+            </a:schemeClr>
+          </a:lnRef>
+          <a:fillRef idx="1">
+            <a:schemeClr val="accent1"/>
+          </a:fillRef>
+          <a:effectRef idx="0">
+            <a:schemeClr val="accent1"/>
+          </a:effectRef>
+          <a:fontRef idx="minor">
+            <a:schemeClr val="lt1"/>
+          </a:fontRef>
+        </p:style>
+        <p:txBody>
+          <a:bodyPr rtlCol="0" anchor="ctr"/>
+          <a:lstStyle>
+            <a:defPPr>
+              <a:defRPr lang="en-US"/>
+            </a:defPPr>
+            <a:lvl1pPr marL="0" algn="l" defTabSz="914377" rtl="0" eaLnBrk="1" latinLnBrk="0" hangingPunct="1">
+              <a:defRPr sz="1800" kern="1200">
+                <a:solidFill>
+                  <a:schemeClr val="lt1"/>
+                </a:solidFill>
+                <a:latin typeface="+mn-lt"/>
+                <a:ea typeface="+mn-ea"/>
+                <a:cs typeface="+mn-cs"/>
+              </a:defRPr>
+            </a:lvl1pPr>
+            <a:lvl2pPr marL="457189" algn="l" defTabSz="914377" rtl="0" eaLnBrk="1" latinLnBrk="0" hangingPunct="1">
+              <a:defRPr sz="1800" kern="1200">
+                <a:solidFill>
+                  <a:schemeClr val="lt1"/>
+                </a:solidFill>
+                <a:latin typeface="+mn-lt"/>
+                <a:ea typeface="+mn-ea"/>
+                <a:cs typeface="+mn-cs"/>
+              </a:defRPr>
+            </a:lvl2pPr>
+            <a:lvl3pPr marL="914377" algn="l" defTabSz="914377" rtl="0" eaLnBrk="1" latinLnBrk="0" hangingPunct="1">
+              <a:defRPr sz="1800" kern="1200">
+                <a:solidFill>
+                  <a:schemeClr val="lt1"/>
+                </a:solidFill>
+                <a:latin typeface="+mn-lt"/>
+                <a:ea typeface="+mn-ea"/>
+                <a:cs typeface="+mn-cs"/>
+              </a:defRPr>
+            </a:lvl3pPr>
+            <a:lvl4pPr marL="1371566" algn="l" defTabSz="914377" rtl="0" eaLnBrk="1" latinLnBrk="0" hangingPunct="1">
+              <a:defRPr sz="1800" kern="1200">
+                <a:solidFill>
+                  <a:schemeClr val="lt1"/>
+                </a:solidFill>
+                <a:latin typeface="+mn-lt"/>
+                <a:ea typeface="+mn-ea"/>
+                <a:cs typeface="+mn-cs"/>
+              </a:defRPr>
+            </a:lvl4pPr>
+            <a:lvl5pPr marL="1828754" algn="l" defTabSz="914377" rtl="0" eaLnBrk="1" latinLnBrk="0" hangingPunct="1">
+              <a:defRPr sz="1800" kern="1200">
+                <a:solidFill>
+                  <a:schemeClr val="lt1"/>
+                </a:solidFill>
+                <a:latin typeface="+mn-lt"/>
+                <a:ea typeface="+mn-ea"/>
+                <a:cs typeface="+mn-cs"/>
+              </a:defRPr>
+            </a:lvl5pPr>
+            <a:lvl6pPr marL="2285943" algn="l" defTabSz="914377" rtl="0" eaLnBrk="1" latinLnBrk="0" hangingPunct="1">
+              <a:defRPr sz="1800" kern="1200">
+                <a:solidFill>
+                  <a:schemeClr val="lt1"/>
+                </a:solidFill>
+                <a:latin typeface="+mn-lt"/>
+                <a:ea typeface="+mn-ea"/>
+                <a:cs typeface="+mn-cs"/>
+              </a:defRPr>
+            </a:lvl6pPr>
+            <a:lvl7pPr marL="2743131" algn="l" defTabSz="914377" rtl="0" eaLnBrk="1" latinLnBrk="0" hangingPunct="1">
+              <a:defRPr sz="1800" kern="1200">
+                <a:solidFill>
+                  <a:schemeClr val="lt1"/>
+                </a:solidFill>
+                <a:latin typeface="+mn-lt"/>
+                <a:ea typeface="+mn-ea"/>
+                <a:cs typeface="+mn-cs"/>
+              </a:defRPr>
+            </a:lvl7pPr>
+            <a:lvl8pPr marL="3200320" algn="l" defTabSz="914377" rtl="0" eaLnBrk="1" latinLnBrk="0" hangingPunct="1">
+              <a:defRPr sz="1800" kern="1200">
+                <a:solidFill>
+                  <a:schemeClr val="lt1"/>
+                </a:solidFill>
+                <a:latin typeface="+mn-lt"/>
+                <a:ea typeface="+mn-ea"/>
+                <a:cs typeface="+mn-cs"/>
+              </a:defRPr>
+            </a:lvl8pPr>
+            <a:lvl9pPr marL="3657509" algn="l" defTabSz="914377" rtl="0" eaLnBrk="1" latinLnBrk="0" hangingPunct="1">
+              <a:defRPr sz="1800" kern="1200">
+                <a:solidFill>
+                  <a:schemeClr val="lt1"/>
+                </a:solidFill>
+                <a:latin typeface="+mn-lt"/>
+                <a:ea typeface="+mn-ea"/>
+                <a:cs typeface="+mn-cs"/>
+              </a:defRPr>
+            </a:lvl9pPr>
+          </a:lstStyle>
+          <a:p>
+            <a:pPr algn="ctr"/>
+            <a:r>
+              <a:rPr lang="en-US" sz="1200" dirty="0" err="1">
+                <a:solidFill>
+                  <a:schemeClr val="bg1"/>
+                </a:solidFill>
+              </a:rPr>
+              <a:t>display_vglite.c</a:t>
+            </a:r>
+            <a:endParaRPr lang="en-US" sz="1200" dirty="0">
+              <a:solidFill>
+                <a:schemeClr val="bg1"/>
+              </a:solidFill>
+            </a:endParaRPr>
+          </a:p>
+        </p:txBody>
+      </p:sp>
+      <p:sp>
+        <p:nvSpPr>
+          <p:cNvPr id="13" name="Rounded Rectangle 29">
+            <a:extLst>
+              <a:ext uri="{FF2B5EF4-FFF2-40B4-BE49-F238E27FC236}">
+                <a16:creationId xmlns:a16="http://schemas.microsoft.com/office/drawing/2014/main" id="{F0100BDB-F62D-EF14-CD74-FAC87EBFD6BA}"/>
+              </a:ext>
+            </a:extLst>
+          </p:cNvPr>
+          <p:cNvSpPr/>
+          <p:nvPr/>
+        </p:nvSpPr>
+        <p:spPr>
+          <a:xfrm>
+            <a:off x="5139479" y="3727620"/>
+            <a:ext cx="1645920" cy="288000"/>
+          </a:xfrm>
+          <a:prstGeom prst="roundRect">
+            <a:avLst/>
+          </a:prstGeom>
+          <a:solidFill>
+            <a:srgbClr val="00AEC7"/>
+          </a:solidFill>
+          <a:ln>
+            <a:noFill/>
+          </a:ln>
+        </p:spPr>
+        <p:style>
+          <a:lnRef idx="2">
+            <a:schemeClr val="accent1">
+              <a:shade val="50000"/>
+            </a:schemeClr>
+          </a:lnRef>
+          <a:fillRef idx="1">
+            <a:schemeClr val="accent1"/>
+          </a:fillRef>
+          <a:effectRef idx="0">
+            <a:schemeClr val="accent1"/>
+          </a:effectRef>
+          <a:fontRef idx="minor">
+            <a:schemeClr val="lt1"/>
+          </a:fontRef>
+        </p:style>
+        <p:txBody>
+          <a:bodyPr rtlCol="0" anchor="ctr"/>
+          <a:lstStyle>
+            <a:defPPr>
+              <a:defRPr lang="en-US"/>
+            </a:defPPr>
+            <a:lvl1pPr marL="0" algn="l" defTabSz="914377" rtl="0" eaLnBrk="1" latinLnBrk="0" hangingPunct="1">
+              <a:defRPr sz="1800" kern="1200">
+                <a:solidFill>
+                  <a:schemeClr val="lt1"/>
+                </a:solidFill>
+                <a:latin typeface="+mn-lt"/>
+                <a:ea typeface="+mn-ea"/>
+                <a:cs typeface="+mn-cs"/>
+              </a:defRPr>
+            </a:lvl1pPr>
+            <a:lvl2pPr marL="457189" algn="l" defTabSz="914377" rtl="0" eaLnBrk="1" latinLnBrk="0" hangingPunct="1">
+              <a:defRPr sz="1800" kern="1200">
+                <a:solidFill>
+                  <a:schemeClr val="lt1"/>
+                </a:solidFill>
+                <a:latin typeface="+mn-lt"/>
+                <a:ea typeface="+mn-ea"/>
+                <a:cs typeface="+mn-cs"/>
+              </a:defRPr>
+            </a:lvl2pPr>
+            <a:lvl3pPr marL="914377" algn="l" defTabSz="914377" rtl="0" eaLnBrk="1" latinLnBrk="0" hangingPunct="1">
+              <a:defRPr sz="1800" kern="1200">
+                <a:solidFill>
+                  <a:schemeClr val="lt1"/>
+                </a:solidFill>
+                <a:latin typeface="+mn-lt"/>
+                <a:ea typeface="+mn-ea"/>
+                <a:cs typeface="+mn-cs"/>
+              </a:defRPr>
+            </a:lvl3pPr>
+            <a:lvl4pPr marL="1371566" algn="l" defTabSz="914377" rtl="0" eaLnBrk="1" latinLnBrk="0" hangingPunct="1">
+              <a:defRPr sz="1800" kern="1200">
+                <a:solidFill>
+                  <a:schemeClr val="lt1"/>
+                </a:solidFill>
+                <a:latin typeface="+mn-lt"/>
+                <a:ea typeface="+mn-ea"/>
+                <a:cs typeface="+mn-cs"/>
+              </a:defRPr>
+            </a:lvl4pPr>
+            <a:lvl5pPr marL="1828754" algn="l" defTabSz="914377" rtl="0" eaLnBrk="1" latinLnBrk="0" hangingPunct="1">
+              <a:defRPr sz="1800" kern="1200">
+                <a:solidFill>
+                  <a:schemeClr val="lt1"/>
+                </a:solidFill>
+                <a:latin typeface="+mn-lt"/>
+                <a:ea typeface="+mn-ea"/>
+                <a:cs typeface="+mn-cs"/>
+              </a:defRPr>
+            </a:lvl5pPr>
+            <a:lvl6pPr marL="2285943" algn="l" defTabSz="914377" rtl="0" eaLnBrk="1" latinLnBrk="0" hangingPunct="1">
+              <a:defRPr sz="1800" kern="1200">
+                <a:solidFill>
+                  <a:schemeClr val="lt1"/>
+                </a:solidFill>
+                <a:latin typeface="+mn-lt"/>
+                <a:ea typeface="+mn-ea"/>
+                <a:cs typeface="+mn-cs"/>
+              </a:defRPr>
+            </a:lvl6pPr>
+            <a:lvl7pPr marL="2743131" algn="l" defTabSz="914377" rtl="0" eaLnBrk="1" latinLnBrk="0" hangingPunct="1">
+              <a:defRPr sz="1800" kern="1200">
+                <a:solidFill>
+                  <a:schemeClr val="lt1"/>
+                </a:solidFill>
+                <a:latin typeface="+mn-lt"/>
+                <a:ea typeface="+mn-ea"/>
+                <a:cs typeface="+mn-cs"/>
+              </a:defRPr>
+            </a:lvl7pPr>
+            <a:lvl8pPr marL="3200320" algn="l" defTabSz="914377" rtl="0" eaLnBrk="1" latinLnBrk="0" hangingPunct="1">
+              <a:defRPr sz="1800" kern="1200">
+                <a:solidFill>
+                  <a:schemeClr val="lt1"/>
+                </a:solidFill>
+                <a:latin typeface="+mn-lt"/>
+                <a:ea typeface="+mn-ea"/>
+                <a:cs typeface="+mn-cs"/>
+              </a:defRPr>
+            </a:lvl8pPr>
+            <a:lvl9pPr marL="3657509" algn="l" defTabSz="914377" rtl="0" eaLnBrk="1" latinLnBrk="0" hangingPunct="1">
+              <a:defRPr sz="1800" kern="1200">
+                <a:solidFill>
+                  <a:schemeClr val="lt1"/>
+                </a:solidFill>
+                <a:latin typeface="+mn-lt"/>
+                <a:ea typeface="+mn-ea"/>
+                <a:cs typeface="+mn-cs"/>
+              </a:defRPr>
+            </a:lvl9pPr>
+          </a:lstStyle>
+          <a:p>
+            <a:pPr algn="ctr"/>
+            <a:r>
+              <a:rPr lang="en-US" sz="1200" dirty="0" err="1">
+                <a:solidFill>
+                  <a:schemeClr val="bg1"/>
+                </a:solidFill>
+              </a:rPr>
+              <a:t>vglite_path.c</a:t>
+            </a:r>
+            <a:endParaRPr lang="en-US" sz="1200" dirty="0">
+              <a:solidFill>
+                <a:schemeClr val="bg1"/>
+              </a:solidFill>
+            </a:endParaRPr>
+          </a:p>
+        </p:txBody>
+      </p:sp>
+      <p:grpSp>
+        <p:nvGrpSpPr>
+          <p:cNvPr id="130" name="Group 129">
+            <a:extLst>
+              <a:ext uri="{FF2B5EF4-FFF2-40B4-BE49-F238E27FC236}">
+                <a16:creationId xmlns:a16="http://schemas.microsoft.com/office/drawing/2014/main" id="{313FB7B3-BE7A-AC58-8506-5BE50E779BF4}"/>
+              </a:ext>
+            </a:extLst>
+          </p:cNvPr>
+          <p:cNvGrpSpPr/>
+          <p:nvPr/>
+        </p:nvGrpSpPr>
+        <p:grpSpPr>
+          <a:xfrm>
+            <a:off x="289228" y="3610338"/>
+            <a:ext cx="1046818" cy="544141"/>
+            <a:chOff x="195827" y="6170286"/>
+            <a:chExt cx="1046818" cy="544141"/>
+          </a:xfrm>
+        </p:grpSpPr>
+        <p:sp>
+          <p:nvSpPr>
+            <p:cNvPr id="134" name="Rectangle 133">
+              <a:extLst>
+                <a:ext uri="{FF2B5EF4-FFF2-40B4-BE49-F238E27FC236}">
+                  <a16:creationId xmlns:a16="http://schemas.microsoft.com/office/drawing/2014/main" id="{0A46A596-4A97-7F36-64EF-8D8E21527EC5}"/>
+                </a:ext>
+              </a:extLst>
+            </p:cNvPr>
+            <p:cNvSpPr/>
+            <p:nvPr/>
+          </p:nvSpPr>
+          <p:spPr>
+            <a:xfrm>
+              <a:off x="231685" y="6170286"/>
+              <a:ext cx="927049" cy="276999"/>
+            </a:xfrm>
+            <a:prstGeom prst="rect">
+              <a:avLst/>
+            </a:prstGeom>
+          </p:spPr>
+          <p:txBody>
+            <a:bodyPr wrap="none">
+              <a:spAutoFit/>
+            </a:bodyPr>
+            <a:lstStyle/>
+            <a:p>
+              <a:r>
+                <a:rPr lang="en-US" sz="1200" dirty="0"/>
+                <a:t>implements</a:t>
+              </a:r>
+            </a:p>
+          </p:txBody>
+        </p:sp>
+        <p:cxnSp>
+          <p:nvCxnSpPr>
+            <p:cNvPr id="135" name="Straight Arrow Connector 134">
+              <a:extLst>
+                <a:ext uri="{FF2B5EF4-FFF2-40B4-BE49-F238E27FC236}">
+                  <a16:creationId xmlns:a16="http://schemas.microsoft.com/office/drawing/2014/main" id="{48B9013D-E597-AE1D-4BBC-E26EA575EA74}"/>
+                </a:ext>
+              </a:extLst>
+            </p:cNvPr>
+            <p:cNvCxnSpPr>
+              <a:cxnSpLocks/>
+            </p:cNvCxnSpPr>
+            <p:nvPr/>
+          </p:nvCxnSpPr>
+          <p:spPr>
+            <a:xfrm flipH="1">
+              <a:off x="195827" y="6437428"/>
+              <a:ext cx="1046818" cy="1660"/>
+            </a:xfrm>
+            <a:prstGeom prst="straightConnector1">
+              <a:avLst/>
+            </a:prstGeom>
+            <a:ln>
+              <a:tailEnd type="triangle"/>
+            </a:ln>
+          </p:spPr>
+          <p:style>
+            <a:lnRef idx="1">
+              <a:schemeClr val="accent1"/>
+            </a:lnRef>
+            <a:fillRef idx="0">
+              <a:schemeClr val="accent1"/>
+            </a:fillRef>
+            <a:effectRef idx="0">
+              <a:schemeClr val="accent1"/>
+            </a:effectRef>
+            <a:fontRef idx="minor">
+              <a:schemeClr val="tx1"/>
+            </a:fontRef>
+          </p:style>
+        </p:cxnSp>
+        <p:sp>
+          <p:nvSpPr>
+            <p:cNvPr id="137" name="Rectangle 136">
+              <a:extLst>
+                <a:ext uri="{FF2B5EF4-FFF2-40B4-BE49-F238E27FC236}">
+                  <a16:creationId xmlns:a16="http://schemas.microsoft.com/office/drawing/2014/main" id="{C881B6EA-E9EA-90AA-D2A2-DBDFD765F6D4}"/>
+                </a:ext>
+              </a:extLst>
+            </p:cNvPr>
+            <p:cNvSpPr/>
+            <p:nvPr/>
+          </p:nvSpPr>
+          <p:spPr>
+            <a:xfrm>
+              <a:off x="231685" y="6437428"/>
+              <a:ext cx="696729" cy="276999"/>
+            </a:xfrm>
+            <a:prstGeom prst="rect">
+              <a:avLst/>
+            </a:prstGeom>
+          </p:spPr>
+          <p:txBody>
+            <a:bodyPr wrap="none">
+              <a:spAutoFit/>
+            </a:bodyPr>
+            <a:lstStyle/>
+            <a:p>
+              <a:r>
+                <a:rPr lang="en-US" sz="1200" dirty="0"/>
+                <a:t>requires</a:t>
+              </a:r>
+            </a:p>
+          </p:txBody>
+        </p:sp>
+        <p:cxnSp>
+          <p:nvCxnSpPr>
+            <p:cNvPr id="138" name="Straight Arrow Connector 137">
+              <a:extLst>
+                <a:ext uri="{FF2B5EF4-FFF2-40B4-BE49-F238E27FC236}">
+                  <a16:creationId xmlns:a16="http://schemas.microsoft.com/office/drawing/2014/main" id="{C7AE6EAB-124A-2145-A56F-F27234B7EC07}"/>
+                </a:ext>
+              </a:extLst>
+            </p:cNvPr>
+            <p:cNvCxnSpPr>
+              <a:cxnSpLocks/>
+            </p:cNvCxnSpPr>
+            <p:nvPr/>
+          </p:nvCxnSpPr>
+          <p:spPr>
+            <a:xfrm flipH="1">
+              <a:off x="195827" y="6706230"/>
+              <a:ext cx="1046818" cy="0"/>
+            </a:xfrm>
+            <a:prstGeom prst="straightConnector1">
+              <a:avLst/>
+            </a:prstGeom>
+            <a:ln>
+              <a:tailEnd type="triangle"/>
+            </a:ln>
+          </p:spPr>
+          <p:style>
+            <a:lnRef idx="1">
+              <a:schemeClr val="accent2"/>
+            </a:lnRef>
+            <a:fillRef idx="0">
+              <a:schemeClr val="accent2"/>
+            </a:fillRef>
+            <a:effectRef idx="0">
+              <a:schemeClr val="accent2"/>
+            </a:effectRef>
+            <a:fontRef idx="minor">
+              <a:schemeClr val="tx1"/>
+            </a:fontRef>
+          </p:style>
+        </p:cxnSp>
+      </p:grpSp>
+      <p:cxnSp>
+        <p:nvCxnSpPr>
+          <p:cNvPr id="156" name="Straight Arrow Connector 155">
+            <a:extLst>
+              <a:ext uri="{FF2B5EF4-FFF2-40B4-BE49-F238E27FC236}">
+                <a16:creationId xmlns:a16="http://schemas.microsoft.com/office/drawing/2014/main" id="{1AB6B6B5-F553-FB3F-D66F-8EEE2BF53CDF}"/>
+              </a:ext>
+            </a:extLst>
+          </p:cNvPr>
+          <p:cNvCxnSpPr>
+            <a:cxnSpLocks/>
+            <a:stCxn id="17" idx="3"/>
+            <a:endCxn id="119" idx="1"/>
+          </p:cNvCxnSpPr>
+          <p:nvPr/>
+        </p:nvCxnSpPr>
+        <p:spPr>
+          <a:xfrm flipV="1">
+            <a:off x="6917251" y="3510439"/>
+            <a:ext cx="876363" cy="7130"/>
+          </a:xfrm>
+          <a:prstGeom prst="straightConnector1">
+            <a:avLst/>
+          </a:prstGeom>
+          <a:ln>
+            <a:tailEnd type="triangle"/>
+          </a:ln>
+        </p:spPr>
+        <p:style>
+          <a:lnRef idx="1">
+            <a:schemeClr val="accent2"/>
+          </a:lnRef>
+          <a:fillRef idx="0">
+            <a:schemeClr val="accent2"/>
+          </a:fillRef>
+          <a:effectRef idx="0">
+            <a:schemeClr val="accent2"/>
+          </a:effectRef>
+          <a:fontRef idx="minor">
+            <a:schemeClr val="tx1"/>
+          </a:fontRef>
+        </p:style>
+      </p:cxnSp>
+      <p:cxnSp>
+        <p:nvCxnSpPr>
+          <p:cNvPr id="34" name="Straight Arrow Connector 33">
+            <a:extLst>
+              <a:ext uri="{FF2B5EF4-FFF2-40B4-BE49-F238E27FC236}">
+                <a16:creationId xmlns:a16="http://schemas.microsoft.com/office/drawing/2014/main" id="{DA324B84-925D-C7C9-EB01-35FAA994BD05}"/>
+              </a:ext>
+            </a:extLst>
+          </p:cNvPr>
+          <p:cNvCxnSpPr>
+            <a:cxnSpLocks/>
+            <a:stCxn id="16" idx="1"/>
+            <a:endCxn id="25" idx="3"/>
+          </p:cNvCxnSpPr>
+          <p:nvPr/>
+        </p:nvCxnSpPr>
+        <p:spPr>
+          <a:xfrm flipH="1" flipV="1">
+            <a:off x="4319222" y="2419752"/>
+            <a:ext cx="820257" cy="719357"/>
+          </a:xfrm>
+          <a:prstGeom prst="straightConnector1">
+            <a:avLst/>
+          </a:prstGeom>
+          <a:ln>
+            <a:tailEnd type="triangle"/>
+          </a:ln>
+        </p:spPr>
+        <p:style>
+          <a:lnRef idx="1">
+            <a:schemeClr val="accent1"/>
+          </a:lnRef>
+          <a:fillRef idx="0">
+            <a:schemeClr val="accent1"/>
+          </a:fillRef>
+          <a:effectRef idx="0">
+            <a:schemeClr val="accent1"/>
+          </a:effectRef>
+          <a:fontRef idx="minor">
+            <a:schemeClr val="tx1"/>
+          </a:fontRef>
+        </p:style>
+      </p:cxnSp>
+      <p:grpSp>
+        <p:nvGrpSpPr>
+          <p:cNvPr id="118" name="Group 117">
+            <a:extLst>
+              <a:ext uri="{FF2B5EF4-FFF2-40B4-BE49-F238E27FC236}">
+                <a16:creationId xmlns:a16="http://schemas.microsoft.com/office/drawing/2014/main" id="{A3A22C73-5836-C990-F305-E3C7BB703C33}"/>
+              </a:ext>
+            </a:extLst>
+          </p:cNvPr>
+          <p:cNvGrpSpPr/>
+          <p:nvPr/>
+        </p:nvGrpSpPr>
+        <p:grpSpPr>
+          <a:xfrm>
+            <a:off x="7793614" y="2815642"/>
+            <a:ext cx="1786503" cy="1112595"/>
+            <a:chOff x="9856130" y="1428812"/>
+            <a:chExt cx="1786503" cy="1112595"/>
+          </a:xfrm>
+        </p:grpSpPr>
+        <p:sp>
+          <p:nvSpPr>
+            <p:cNvPr id="119" name="Rounded Rectangle 62">
+              <a:extLst>
+                <a:ext uri="{FF2B5EF4-FFF2-40B4-BE49-F238E27FC236}">
+                  <a16:creationId xmlns:a16="http://schemas.microsoft.com/office/drawing/2014/main" id="{BFA02B11-8CF9-F243-2EE1-CA4CA0B32A78}"/>
+                </a:ext>
+              </a:extLst>
+            </p:cNvPr>
+            <p:cNvSpPr/>
+            <p:nvPr/>
+          </p:nvSpPr>
+          <p:spPr>
+            <a:xfrm>
+              <a:off x="9856130" y="1705811"/>
+              <a:ext cx="1786503" cy="835596"/>
+            </a:xfrm>
+            <a:prstGeom prst="roundRect">
+              <a:avLst>
+                <a:gd name="adj" fmla="val 5059"/>
+              </a:avLst>
+            </a:prstGeom>
+            <a:solidFill>
+              <a:schemeClr val="bg1">
+                <a:lumMod val="95000"/>
+              </a:schemeClr>
+            </a:solidFill>
+            <a:ln w="19050">
+              <a:noFill/>
+            </a:ln>
+          </p:spPr>
+          <p:style>
+            <a:lnRef idx="2">
+              <a:schemeClr val="accent1">
+                <a:shade val="50000"/>
+              </a:schemeClr>
+            </a:lnRef>
+            <a:fillRef idx="1">
+              <a:schemeClr val="accent1"/>
+            </a:fillRef>
+            <a:effectRef idx="0">
+              <a:schemeClr val="accent1"/>
+            </a:effectRef>
+            <a:fontRef idx="minor">
+              <a:schemeClr val="lt1"/>
+            </a:fontRef>
+          </p:style>
+          <p:txBody>
+            <a:bodyPr wrap="square" lIns="0" tIns="0" rIns="0" bIns="0" rtlCol="0" anchor="ctr"/>
+            <a:lstStyle/>
+            <a:p>
+              <a:pPr algn="ctr"/>
+              <a:endParaRPr lang="en-US" sz="1200" dirty="0">
+                <a:solidFill>
+                  <a:schemeClr val="bg1">
+                    <a:lumMod val="95000"/>
+                  </a:schemeClr>
+                </a:solidFill>
+              </a:endParaRPr>
+            </a:p>
+          </p:txBody>
+        </p:sp>
+        <p:sp>
+          <p:nvSpPr>
+            <p:cNvPr id="120" name="Rectangle 119">
+              <a:extLst>
+                <a:ext uri="{FF2B5EF4-FFF2-40B4-BE49-F238E27FC236}">
+                  <a16:creationId xmlns:a16="http://schemas.microsoft.com/office/drawing/2014/main" id="{76AE76FD-4400-7C78-6028-A760A1F5F52C}"/>
+                </a:ext>
+              </a:extLst>
+            </p:cNvPr>
+            <p:cNvSpPr/>
+            <p:nvPr/>
+          </p:nvSpPr>
+          <p:spPr>
+            <a:xfrm>
+              <a:off x="9856130" y="1428812"/>
+              <a:ext cx="1556836" cy="276999"/>
+            </a:xfrm>
+            <a:prstGeom prst="rect">
+              <a:avLst/>
+            </a:prstGeom>
+          </p:spPr>
+          <p:txBody>
+            <a:bodyPr wrap="none">
+              <a:spAutoFit/>
+            </a:bodyPr>
+            <a:lstStyle/>
+            <a:p>
+              <a:r>
+                <a:rPr lang="en-US" sz="1200" dirty="0"/>
+                <a:t>Library </a:t>
+              </a:r>
+              <a:r>
+                <a:rPr lang="en-US" sz="1200" dirty="0" err="1"/>
+                <a:t>Vivante</a:t>
+              </a:r>
+              <a:r>
+                <a:rPr lang="en-US" sz="1200" dirty="0"/>
+                <a:t> </a:t>
+              </a:r>
+              <a:r>
+                <a:rPr lang="en-US" sz="1200" dirty="0" err="1"/>
+                <a:t>VGLite</a:t>
+              </a:r>
+              <a:endParaRPr lang="en-US" sz="1200" dirty="0"/>
+            </a:p>
+          </p:txBody>
+        </p:sp>
+        <p:sp>
+          <p:nvSpPr>
+            <p:cNvPr id="121" name="Rounded Rectangle 12">
+              <a:extLst>
+                <a:ext uri="{FF2B5EF4-FFF2-40B4-BE49-F238E27FC236}">
+                  <a16:creationId xmlns:a16="http://schemas.microsoft.com/office/drawing/2014/main" id="{7E47ED9A-27C5-0A34-0300-21857E43E1FE}"/>
+                </a:ext>
+              </a:extLst>
+            </p:cNvPr>
+            <p:cNvSpPr/>
+            <p:nvPr/>
+          </p:nvSpPr>
+          <p:spPr>
+            <a:xfrm>
+              <a:off x="9920126" y="1811781"/>
+              <a:ext cx="1645920" cy="288000"/>
+            </a:xfrm>
+            <a:prstGeom prst="roundRect">
+              <a:avLst/>
+            </a:prstGeom>
+            <a:solidFill>
+              <a:srgbClr val="6CC24A"/>
+            </a:solidFill>
+            <a:ln>
+              <a:noFill/>
+            </a:ln>
+          </p:spPr>
+          <p:style>
+            <a:lnRef idx="2">
+              <a:schemeClr val="accent1">
+                <a:shade val="50000"/>
+              </a:schemeClr>
+            </a:lnRef>
+            <a:fillRef idx="1">
+              <a:schemeClr val="accent1"/>
+            </a:fillRef>
+            <a:effectRef idx="0">
+              <a:schemeClr val="accent1"/>
+            </a:effectRef>
+            <a:fontRef idx="minor">
+              <a:schemeClr val="lt1"/>
+            </a:fontRef>
+          </p:style>
+          <p:txBody>
+            <a:bodyPr rtlCol="0" anchor="ctr"/>
+            <a:lstStyle>
+              <a:defPPr>
+                <a:defRPr lang="en-US"/>
+              </a:defPPr>
+              <a:lvl1pPr marL="0" algn="l" defTabSz="914377" rtl="0" eaLnBrk="1" latinLnBrk="0" hangingPunct="1">
+                <a:defRPr sz="1800" kern="1200">
+                  <a:solidFill>
+                    <a:schemeClr val="lt1"/>
+                  </a:solidFill>
+                  <a:latin typeface="+mn-lt"/>
+                  <a:ea typeface="+mn-ea"/>
+                  <a:cs typeface="+mn-cs"/>
+                </a:defRPr>
+              </a:lvl1pPr>
+              <a:lvl2pPr marL="457189" algn="l" defTabSz="914377" rtl="0" eaLnBrk="1" latinLnBrk="0" hangingPunct="1">
+                <a:defRPr sz="1800" kern="1200">
+                  <a:solidFill>
+                    <a:schemeClr val="lt1"/>
+                  </a:solidFill>
+                  <a:latin typeface="+mn-lt"/>
+                  <a:ea typeface="+mn-ea"/>
+                  <a:cs typeface="+mn-cs"/>
+                </a:defRPr>
+              </a:lvl2pPr>
+              <a:lvl3pPr marL="914377" algn="l" defTabSz="914377" rtl="0" eaLnBrk="1" latinLnBrk="0" hangingPunct="1">
+                <a:defRPr sz="1800" kern="1200">
+                  <a:solidFill>
+                    <a:schemeClr val="lt1"/>
+                  </a:solidFill>
+                  <a:latin typeface="+mn-lt"/>
+                  <a:ea typeface="+mn-ea"/>
+                  <a:cs typeface="+mn-cs"/>
+                </a:defRPr>
+              </a:lvl3pPr>
+              <a:lvl4pPr marL="1371566" algn="l" defTabSz="914377" rtl="0" eaLnBrk="1" latinLnBrk="0" hangingPunct="1">
+                <a:defRPr sz="1800" kern="1200">
+                  <a:solidFill>
+                    <a:schemeClr val="lt1"/>
+                  </a:solidFill>
+                  <a:latin typeface="+mn-lt"/>
+                  <a:ea typeface="+mn-ea"/>
+                  <a:cs typeface="+mn-cs"/>
+                </a:defRPr>
+              </a:lvl4pPr>
+              <a:lvl5pPr marL="1828754" algn="l" defTabSz="914377" rtl="0" eaLnBrk="1" latinLnBrk="0" hangingPunct="1">
+                <a:defRPr sz="1800" kern="1200">
+                  <a:solidFill>
+                    <a:schemeClr val="lt1"/>
+                  </a:solidFill>
+                  <a:latin typeface="+mn-lt"/>
+                  <a:ea typeface="+mn-ea"/>
+                  <a:cs typeface="+mn-cs"/>
+                </a:defRPr>
+              </a:lvl5pPr>
+              <a:lvl6pPr marL="2285943" algn="l" defTabSz="914377" rtl="0" eaLnBrk="1" latinLnBrk="0" hangingPunct="1">
+                <a:defRPr sz="1800" kern="1200">
+                  <a:solidFill>
+                    <a:schemeClr val="lt1"/>
+                  </a:solidFill>
+                  <a:latin typeface="+mn-lt"/>
+                  <a:ea typeface="+mn-ea"/>
+                  <a:cs typeface="+mn-cs"/>
+                </a:defRPr>
+              </a:lvl6pPr>
+              <a:lvl7pPr marL="2743131" algn="l" defTabSz="914377" rtl="0" eaLnBrk="1" latinLnBrk="0" hangingPunct="1">
+                <a:defRPr sz="1800" kern="1200">
+                  <a:solidFill>
+                    <a:schemeClr val="lt1"/>
+                  </a:solidFill>
+                  <a:latin typeface="+mn-lt"/>
+                  <a:ea typeface="+mn-ea"/>
+                  <a:cs typeface="+mn-cs"/>
+                </a:defRPr>
+              </a:lvl7pPr>
+              <a:lvl8pPr marL="3200320" algn="l" defTabSz="914377" rtl="0" eaLnBrk="1" latinLnBrk="0" hangingPunct="1">
+                <a:defRPr sz="1800" kern="1200">
+                  <a:solidFill>
+                    <a:schemeClr val="lt1"/>
+                  </a:solidFill>
+                  <a:latin typeface="+mn-lt"/>
+                  <a:ea typeface="+mn-ea"/>
+                  <a:cs typeface="+mn-cs"/>
+                </a:defRPr>
+              </a:lvl8pPr>
+              <a:lvl9pPr marL="3657509" algn="l" defTabSz="914377" rtl="0" eaLnBrk="1" latinLnBrk="0" hangingPunct="1">
+                <a:defRPr sz="1800" kern="1200">
+                  <a:solidFill>
+                    <a:schemeClr val="lt1"/>
+                  </a:solidFill>
+                  <a:latin typeface="+mn-lt"/>
+                  <a:ea typeface="+mn-ea"/>
+                  <a:cs typeface="+mn-cs"/>
+                </a:defRPr>
+              </a:lvl9pPr>
+            </a:lstStyle>
+            <a:p>
+              <a:pPr algn="ctr"/>
+              <a:r>
+                <a:rPr lang="en-US" sz="1200" dirty="0">
+                  <a:solidFill>
+                    <a:schemeClr val="bg1"/>
+                  </a:solidFill>
+                </a:rPr>
+                <a:t>[…]</a:t>
+              </a:r>
+            </a:p>
+          </p:txBody>
+        </p:sp>
+        <p:sp>
+          <p:nvSpPr>
+            <p:cNvPr id="122" name="Rounded Rectangle 28">
+              <a:extLst>
+                <a:ext uri="{FF2B5EF4-FFF2-40B4-BE49-F238E27FC236}">
+                  <a16:creationId xmlns:a16="http://schemas.microsoft.com/office/drawing/2014/main" id="{274712E9-D671-4FA9-9851-36C04260CB84}"/>
+                </a:ext>
+              </a:extLst>
+            </p:cNvPr>
+            <p:cNvSpPr/>
+            <p:nvPr/>
+          </p:nvSpPr>
+          <p:spPr>
+            <a:xfrm>
+              <a:off x="9908678" y="2185734"/>
+              <a:ext cx="1645920" cy="288000"/>
+            </a:xfrm>
+            <a:prstGeom prst="roundRect">
+              <a:avLst/>
+            </a:prstGeom>
+            <a:solidFill>
+              <a:srgbClr val="00AEC7"/>
+            </a:solidFill>
+            <a:ln>
+              <a:noFill/>
+            </a:ln>
+          </p:spPr>
+          <p:style>
+            <a:lnRef idx="2">
+              <a:schemeClr val="accent1">
+                <a:shade val="50000"/>
+              </a:schemeClr>
+            </a:lnRef>
+            <a:fillRef idx="1">
+              <a:schemeClr val="accent1"/>
+            </a:fillRef>
+            <a:effectRef idx="0">
+              <a:schemeClr val="accent1"/>
+            </a:effectRef>
+            <a:fontRef idx="minor">
+              <a:schemeClr val="lt1"/>
+            </a:fontRef>
+          </p:style>
+          <p:txBody>
+            <a:bodyPr rtlCol="0" anchor="ctr"/>
+            <a:lstStyle>
+              <a:defPPr>
+                <a:defRPr lang="en-US"/>
+              </a:defPPr>
+              <a:lvl1pPr marL="0" algn="l" defTabSz="914377" rtl="0" eaLnBrk="1" latinLnBrk="0" hangingPunct="1">
+                <a:defRPr sz="1800" kern="1200">
+                  <a:solidFill>
+                    <a:schemeClr val="lt1"/>
+                  </a:solidFill>
+                  <a:latin typeface="+mn-lt"/>
+                  <a:ea typeface="+mn-ea"/>
+                  <a:cs typeface="+mn-cs"/>
+                </a:defRPr>
+              </a:lvl1pPr>
+              <a:lvl2pPr marL="457189" algn="l" defTabSz="914377" rtl="0" eaLnBrk="1" latinLnBrk="0" hangingPunct="1">
+                <a:defRPr sz="1800" kern="1200">
+                  <a:solidFill>
+                    <a:schemeClr val="lt1"/>
+                  </a:solidFill>
+                  <a:latin typeface="+mn-lt"/>
+                  <a:ea typeface="+mn-ea"/>
+                  <a:cs typeface="+mn-cs"/>
+                </a:defRPr>
+              </a:lvl2pPr>
+              <a:lvl3pPr marL="914377" algn="l" defTabSz="914377" rtl="0" eaLnBrk="1" latinLnBrk="0" hangingPunct="1">
+                <a:defRPr sz="1800" kern="1200">
+                  <a:solidFill>
+                    <a:schemeClr val="lt1"/>
+                  </a:solidFill>
+                  <a:latin typeface="+mn-lt"/>
+                  <a:ea typeface="+mn-ea"/>
+                  <a:cs typeface="+mn-cs"/>
+                </a:defRPr>
+              </a:lvl3pPr>
+              <a:lvl4pPr marL="1371566" algn="l" defTabSz="914377" rtl="0" eaLnBrk="1" latinLnBrk="0" hangingPunct="1">
+                <a:defRPr sz="1800" kern="1200">
+                  <a:solidFill>
+                    <a:schemeClr val="lt1"/>
+                  </a:solidFill>
+                  <a:latin typeface="+mn-lt"/>
+                  <a:ea typeface="+mn-ea"/>
+                  <a:cs typeface="+mn-cs"/>
+                </a:defRPr>
+              </a:lvl4pPr>
+              <a:lvl5pPr marL="1828754" algn="l" defTabSz="914377" rtl="0" eaLnBrk="1" latinLnBrk="0" hangingPunct="1">
+                <a:defRPr sz="1800" kern="1200">
+                  <a:solidFill>
+                    <a:schemeClr val="lt1"/>
+                  </a:solidFill>
+                  <a:latin typeface="+mn-lt"/>
+                  <a:ea typeface="+mn-ea"/>
+                  <a:cs typeface="+mn-cs"/>
+                </a:defRPr>
+              </a:lvl5pPr>
+              <a:lvl6pPr marL="2285943" algn="l" defTabSz="914377" rtl="0" eaLnBrk="1" latinLnBrk="0" hangingPunct="1">
+                <a:defRPr sz="1800" kern="1200">
+                  <a:solidFill>
+                    <a:schemeClr val="lt1"/>
+                  </a:solidFill>
+                  <a:latin typeface="+mn-lt"/>
+                  <a:ea typeface="+mn-ea"/>
+                  <a:cs typeface="+mn-cs"/>
+                </a:defRPr>
+              </a:lvl6pPr>
+              <a:lvl7pPr marL="2743131" algn="l" defTabSz="914377" rtl="0" eaLnBrk="1" latinLnBrk="0" hangingPunct="1">
+                <a:defRPr sz="1800" kern="1200">
+                  <a:solidFill>
+                    <a:schemeClr val="lt1"/>
+                  </a:solidFill>
+                  <a:latin typeface="+mn-lt"/>
+                  <a:ea typeface="+mn-ea"/>
+                  <a:cs typeface="+mn-cs"/>
+                </a:defRPr>
+              </a:lvl7pPr>
+              <a:lvl8pPr marL="3200320" algn="l" defTabSz="914377" rtl="0" eaLnBrk="1" latinLnBrk="0" hangingPunct="1">
+                <a:defRPr sz="1800" kern="1200">
+                  <a:solidFill>
+                    <a:schemeClr val="lt1"/>
+                  </a:solidFill>
+                  <a:latin typeface="+mn-lt"/>
+                  <a:ea typeface="+mn-ea"/>
+                  <a:cs typeface="+mn-cs"/>
+                </a:defRPr>
+              </a:lvl8pPr>
+              <a:lvl9pPr marL="3657509" algn="l" defTabSz="914377" rtl="0" eaLnBrk="1" latinLnBrk="0" hangingPunct="1">
+                <a:defRPr sz="1800" kern="1200">
+                  <a:solidFill>
+                    <a:schemeClr val="lt1"/>
+                  </a:solidFill>
+                  <a:latin typeface="+mn-lt"/>
+                  <a:ea typeface="+mn-ea"/>
+                  <a:cs typeface="+mn-cs"/>
+                </a:defRPr>
+              </a:lvl9pPr>
+            </a:lstStyle>
+            <a:p>
+              <a:pPr algn="ctr"/>
+              <a:r>
+                <a:rPr lang="en-US" sz="1200" dirty="0">
+                  <a:solidFill>
+                    <a:schemeClr val="bg1"/>
+                  </a:solidFill>
+                </a:rPr>
+                <a:t>[…]</a:t>
+              </a:r>
+            </a:p>
+          </p:txBody>
+        </p:sp>
+      </p:grpSp>
+      <p:sp>
+        <p:nvSpPr>
+          <p:cNvPr id="25" name="Rounded Rectangle 19">
+            <a:extLst>
+              <a:ext uri="{FF2B5EF4-FFF2-40B4-BE49-F238E27FC236}">
+                <a16:creationId xmlns:a16="http://schemas.microsoft.com/office/drawing/2014/main" id="{BBC5A0EF-97C9-45D3-6ADA-D75BF8E6C45E}"/>
+              </a:ext>
+            </a:extLst>
+          </p:cNvPr>
+          <p:cNvSpPr/>
+          <p:nvPr/>
+        </p:nvSpPr>
+        <p:spPr>
+          <a:xfrm>
+            <a:off x="2673302" y="2275752"/>
+            <a:ext cx="1645920" cy="288000"/>
+          </a:xfrm>
+          <a:prstGeom prst="roundRect">
+            <a:avLst/>
+          </a:prstGeom>
+          <a:solidFill>
+            <a:srgbClr val="6CC24A"/>
+          </a:solidFill>
+          <a:ln>
+            <a:noFill/>
+          </a:ln>
+        </p:spPr>
+        <p:style>
+          <a:lnRef idx="2">
+            <a:schemeClr val="accent1">
+              <a:shade val="50000"/>
+            </a:schemeClr>
+          </a:lnRef>
+          <a:fillRef idx="1">
+            <a:schemeClr val="accent1"/>
+          </a:fillRef>
+          <a:effectRef idx="0">
+            <a:schemeClr val="accent1"/>
+          </a:effectRef>
+          <a:fontRef idx="minor">
+            <a:schemeClr val="lt1"/>
+          </a:fontRef>
+        </p:style>
+        <p:txBody>
+          <a:bodyPr rtlCol="0" anchor="ctr"/>
+          <a:lstStyle>
+            <a:defPPr>
+              <a:defRPr lang="en-US"/>
+            </a:defPPr>
+            <a:lvl1pPr marL="0" algn="l" defTabSz="914377" rtl="0" eaLnBrk="1" latinLnBrk="0" hangingPunct="1">
+              <a:defRPr sz="1800" kern="1200">
+                <a:solidFill>
+                  <a:schemeClr val="lt1"/>
+                </a:solidFill>
+                <a:latin typeface="+mn-lt"/>
+                <a:ea typeface="+mn-ea"/>
+                <a:cs typeface="+mn-cs"/>
+              </a:defRPr>
+            </a:lvl1pPr>
+            <a:lvl2pPr marL="457189" algn="l" defTabSz="914377" rtl="0" eaLnBrk="1" latinLnBrk="0" hangingPunct="1">
+              <a:defRPr sz="1800" kern="1200">
+                <a:solidFill>
+                  <a:schemeClr val="lt1"/>
+                </a:solidFill>
+                <a:latin typeface="+mn-lt"/>
+                <a:ea typeface="+mn-ea"/>
+                <a:cs typeface="+mn-cs"/>
+              </a:defRPr>
+            </a:lvl2pPr>
+            <a:lvl3pPr marL="914377" algn="l" defTabSz="914377" rtl="0" eaLnBrk="1" latinLnBrk="0" hangingPunct="1">
+              <a:defRPr sz="1800" kern="1200">
+                <a:solidFill>
+                  <a:schemeClr val="lt1"/>
+                </a:solidFill>
+                <a:latin typeface="+mn-lt"/>
+                <a:ea typeface="+mn-ea"/>
+                <a:cs typeface="+mn-cs"/>
+              </a:defRPr>
+            </a:lvl3pPr>
+            <a:lvl4pPr marL="1371566" algn="l" defTabSz="914377" rtl="0" eaLnBrk="1" latinLnBrk="0" hangingPunct="1">
+              <a:defRPr sz="1800" kern="1200">
+                <a:solidFill>
+                  <a:schemeClr val="lt1"/>
+                </a:solidFill>
+                <a:latin typeface="+mn-lt"/>
+                <a:ea typeface="+mn-ea"/>
+                <a:cs typeface="+mn-cs"/>
+              </a:defRPr>
+            </a:lvl4pPr>
+            <a:lvl5pPr marL="1828754" algn="l" defTabSz="914377" rtl="0" eaLnBrk="1" latinLnBrk="0" hangingPunct="1">
+              <a:defRPr sz="1800" kern="1200">
+                <a:solidFill>
+                  <a:schemeClr val="lt1"/>
+                </a:solidFill>
+                <a:latin typeface="+mn-lt"/>
+                <a:ea typeface="+mn-ea"/>
+                <a:cs typeface="+mn-cs"/>
+              </a:defRPr>
+            </a:lvl5pPr>
+            <a:lvl6pPr marL="2285943" algn="l" defTabSz="914377" rtl="0" eaLnBrk="1" latinLnBrk="0" hangingPunct="1">
+              <a:defRPr sz="1800" kern="1200">
+                <a:solidFill>
+                  <a:schemeClr val="lt1"/>
+                </a:solidFill>
+                <a:latin typeface="+mn-lt"/>
+                <a:ea typeface="+mn-ea"/>
+                <a:cs typeface="+mn-cs"/>
+              </a:defRPr>
+            </a:lvl6pPr>
+            <a:lvl7pPr marL="2743131" algn="l" defTabSz="914377" rtl="0" eaLnBrk="1" latinLnBrk="0" hangingPunct="1">
+              <a:defRPr sz="1800" kern="1200">
+                <a:solidFill>
+                  <a:schemeClr val="lt1"/>
+                </a:solidFill>
+                <a:latin typeface="+mn-lt"/>
+                <a:ea typeface="+mn-ea"/>
+                <a:cs typeface="+mn-cs"/>
+              </a:defRPr>
+            </a:lvl7pPr>
+            <a:lvl8pPr marL="3200320" algn="l" defTabSz="914377" rtl="0" eaLnBrk="1" latinLnBrk="0" hangingPunct="1">
+              <a:defRPr sz="1800" kern="1200">
+                <a:solidFill>
+                  <a:schemeClr val="lt1"/>
+                </a:solidFill>
+                <a:latin typeface="+mn-lt"/>
+                <a:ea typeface="+mn-ea"/>
+                <a:cs typeface="+mn-cs"/>
+              </a:defRPr>
+            </a:lvl8pPr>
+            <a:lvl9pPr marL="3657509" algn="l" defTabSz="914377" rtl="0" eaLnBrk="1" latinLnBrk="0" hangingPunct="1">
+              <a:defRPr sz="1800" kern="1200">
+                <a:solidFill>
+                  <a:schemeClr val="lt1"/>
+                </a:solidFill>
+                <a:latin typeface="+mn-lt"/>
+                <a:ea typeface="+mn-ea"/>
+                <a:cs typeface="+mn-cs"/>
+              </a:defRPr>
+            </a:lvl9pPr>
+          </a:lstStyle>
+          <a:p>
+            <a:pPr algn="ctr"/>
+            <a:r>
+              <a:rPr lang="en-US" sz="1200" dirty="0" err="1">
+                <a:solidFill>
+                  <a:schemeClr val="bg1"/>
+                </a:solidFill>
+              </a:rPr>
+              <a:t>ui_drawing.h</a:t>
+            </a:r>
+            <a:endParaRPr lang="en-US" sz="1200" dirty="0">
+              <a:solidFill>
+                <a:schemeClr val="bg1"/>
+              </a:solidFill>
+            </a:endParaRPr>
+          </a:p>
+        </p:txBody>
+      </p:sp>
+      <p:sp>
+        <p:nvSpPr>
+          <p:cNvPr id="26" name="Rounded Rectangle 19">
+            <a:extLst>
+              <a:ext uri="{FF2B5EF4-FFF2-40B4-BE49-F238E27FC236}">
+                <a16:creationId xmlns:a16="http://schemas.microsoft.com/office/drawing/2014/main" id="{5D47CC50-A6B8-F84B-CABC-C6F5820A4644}"/>
+              </a:ext>
+            </a:extLst>
+          </p:cNvPr>
+          <p:cNvSpPr/>
+          <p:nvPr/>
+        </p:nvSpPr>
+        <p:spPr>
+          <a:xfrm>
+            <a:off x="2673302" y="2659157"/>
+            <a:ext cx="1645920" cy="288000"/>
+          </a:xfrm>
+          <a:prstGeom prst="roundRect">
+            <a:avLst/>
+          </a:prstGeom>
+          <a:solidFill>
+            <a:srgbClr val="6CC24A"/>
+          </a:solidFill>
+          <a:ln>
+            <a:noFill/>
+          </a:ln>
+        </p:spPr>
+        <p:style>
+          <a:lnRef idx="2">
+            <a:schemeClr val="accent1">
+              <a:shade val="50000"/>
+            </a:schemeClr>
+          </a:lnRef>
+          <a:fillRef idx="1">
+            <a:schemeClr val="accent1"/>
+          </a:fillRef>
+          <a:effectRef idx="0">
+            <a:schemeClr val="accent1"/>
+          </a:effectRef>
+          <a:fontRef idx="minor">
+            <a:schemeClr val="lt1"/>
+          </a:fontRef>
+        </p:style>
+        <p:txBody>
+          <a:bodyPr rtlCol="0" anchor="ctr"/>
+          <a:lstStyle>
+            <a:defPPr>
+              <a:defRPr lang="en-US"/>
+            </a:defPPr>
+            <a:lvl1pPr marL="0" algn="l" defTabSz="914377" rtl="0" eaLnBrk="1" latinLnBrk="0" hangingPunct="1">
+              <a:defRPr sz="1800" kern="1200">
+                <a:solidFill>
+                  <a:schemeClr val="lt1"/>
+                </a:solidFill>
+                <a:latin typeface="+mn-lt"/>
+                <a:ea typeface="+mn-ea"/>
+                <a:cs typeface="+mn-cs"/>
+              </a:defRPr>
+            </a:lvl1pPr>
+            <a:lvl2pPr marL="457189" algn="l" defTabSz="914377" rtl="0" eaLnBrk="1" latinLnBrk="0" hangingPunct="1">
+              <a:defRPr sz="1800" kern="1200">
+                <a:solidFill>
+                  <a:schemeClr val="lt1"/>
+                </a:solidFill>
+                <a:latin typeface="+mn-lt"/>
+                <a:ea typeface="+mn-ea"/>
+                <a:cs typeface="+mn-cs"/>
+              </a:defRPr>
+            </a:lvl2pPr>
+            <a:lvl3pPr marL="914377" algn="l" defTabSz="914377" rtl="0" eaLnBrk="1" latinLnBrk="0" hangingPunct="1">
+              <a:defRPr sz="1800" kern="1200">
+                <a:solidFill>
+                  <a:schemeClr val="lt1"/>
+                </a:solidFill>
+                <a:latin typeface="+mn-lt"/>
+                <a:ea typeface="+mn-ea"/>
+                <a:cs typeface="+mn-cs"/>
+              </a:defRPr>
+            </a:lvl3pPr>
+            <a:lvl4pPr marL="1371566" algn="l" defTabSz="914377" rtl="0" eaLnBrk="1" latinLnBrk="0" hangingPunct="1">
+              <a:defRPr sz="1800" kern="1200">
+                <a:solidFill>
+                  <a:schemeClr val="lt1"/>
+                </a:solidFill>
+                <a:latin typeface="+mn-lt"/>
+                <a:ea typeface="+mn-ea"/>
+                <a:cs typeface="+mn-cs"/>
+              </a:defRPr>
+            </a:lvl4pPr>
+            <a:lvl5pPr marL="1828754" algn="l" defTabSz="914377" rtl="0" eaLnBrk="1" latinLnBrk="0" hangingPunct="1">
+              <a:defRPr sz="1800" kern="1200">
+                <a:solidFill>
+                  <a:schemeClr val="lt1"/>
+                </a:solidFill>
+                <a:latin typeface="+mn-lt"/>
+                <a:ea typeface="+mn-ea"/>
+                <a:cs typeface="+mn-cs"/>
+              </a:defRPr>
+            </a:lvl5pPr>
+            <a:lvl6pPr marL="2285943" algn="l" defTabSz="914377" rtl="0" eaLnBrk="1" latinLnBrk="0" hangingPunct="1">
+              <a:defRPr sz="1800" kern="1200">
+                <a:solidFill>
+                  <a:schemeClr val="lt1"/>
+                </a:solidFill>
+                <a:latin typeface="+mn-lt"/>
+                <a:ea typeface="+mn-ea"/>
+                <a:cs typeface="+mn-cs"/>
+              </a:defRPr>
+            </a:lvl6pPr>
+            <a:lvl7pPr marL="2743131" algn="l" defTabSz="914377" rtl="0" eaLnBrk="1" latinLnBrk="0" hangingPunct="1">
+              <a:defRPr sz="1800" kern="1200">
+                <a:solidFill>
+                  <a:schemeClr val="lt1"/>
+                </a:solidFill>
+                <a:latin typeface="+mn-lt"/>
+                <a:ea typeface="+mn-ea"/>
+                <a:cs typeface="+mn-cs"/>
+              </a:defRPr>
+            </a:lvl7pPr>
+            <a:lvl8pPr marL="3200320" algn="l" defTabSz="914377" rtl="0" eaLnBrk="1" latinLnBrk="0" hangingPunct="1">
+              <a:defRPr sz="1800" kern="1200">
+                <a:solidFill>
+                  <a:schemeClr val="lt1"/>
+                </a:solidFill>
+                <a:latin typeface="+mn-lt"/>
+                <a:ea typeface="+mn-ea"/>
+                <a:cs typeface="+mn-cs"/>
+              </a:defRPr>
+            </a:lvl8pPr>
+            <a:lvl9pPr marL="3657509" algn="l" defTabSz="914377" rtl="0" eaLnBrk="1" latinLnBrk="0" hangingPunct="1">
+              <a:defRPr sz="1800" kern="1200">
+                <a:solidFill>
+                  <a:schemeClr val="lt1"/>
+                </a:solidFill>
+                <a:latin typeface="+mn-lt"/>
+                <a:ea typeface="+mn-ea"/>
+                <a:cs typeface="+mn-cs"/>
+              </a:defRPr>
+            </a:lvl9pPr>
+          </a:lstStyle>
+          <a:p>
+            <a:pPr algn="ctr"/>
+            <a:r>
+              <a:rPr lang="en-US" sz="1200" dirty="0" err="1">
+                <a:solidFill>
+                  <a:schemeClr val="bg1"/>
+                </a:solidFill>
+              </a:rPr>
+              <a:t>ui_image_drawing.h</a:t>
+            </a:r>
+            <a:endParaRPr lang="en-US" sz="1200" dirty="0">
+              <a:solidFill>
+                <a:schemeClr val="bg1"/>
+              </a:solidFill>
+            </a:endParaRPr>
+          </a:p>
+        </p:txBody>
+      </p:sp>
+      <p:sp>
+        <p:nvSpPr>
+          <p:cNvPr id="45" name="Rounded Rectangle 62">
+            <a:extLst>
+              <a:ext uri="{FF2B5EF4-FFF2-40B4-BE49-F238E27FC236}">
+                <a16:creationId xmlns:a16="http://schemas.microsoft.com/office/drawing/2014/main" id="{7F314EDC-5CBE-F631-91D7-078F50166933}"/>
+              </a:ext>
+            </a:extLst>
+          </p:cNvPr>
+          <p:cNvSpPr/>
+          <p:nvPr/>
+        </p:nvSpPr>
+        <p:spPr>
+          <a:xfrm>
+            <a:off x="5049795" y="1618538"/>
+            <a:ext cx="1867456" cy="535449"/>
+          </a:xfrm>
+          <a:prstGeom prst="roundRect">
+            <a:avLst>
+              <a:gd name="adj" fmla="val 5059"/>
+            </a:avLst>
+          </a:prstGeom>
+          <a:solidFill>
+            <a:schemeClr val="bg1">
+              <a:lumMod val="95000"/>
+            </a:schemeClr>
+          </a:solidFill>
+          <a:ln w="19050">
+            <a:solidFill>
+              <a:schemeClr val="tx2"/>
+            </a:solidFill>
+          </a:ln>
+        </p:spPr>
+        <p:style>
+          <a:lnRef idx="2">
+            <a:schemeClr val="accent1">
+              <a:shade val="50000"/>
+            </a:schemeClr>
+          </a:lnRef>
+          <a:fillRef idx="1">
+            <a:schemeClr val="accent1"/>
+          </a:fillRef>
+          <a:effectRef idx="0">
+            <a:schemeClr val="accent1"/>
+          </a:effectRef>
+          <a:fontRef idx="minor">
+            <a:schemeClr val="lt1"/>
+          </a:fontRef>
+        </p:style>
+        <p:txBody>
+          <a:bodyPr wrap="square" lIns="0" tIns="0" rIns="0" bIns="0" rtlCol="0" anchor="ctr"/>
+          <a:lstStyle/>
+          <a:p>
+            <a:pPr algn="ctr"/>
+            <a:endParaRPr lang="en-US" sz="1200" dirty="0">
+              <a:solidFill>
+                <a:schemeClr val="bg1">
+                  <a:lumMod val="95000"/>
+                </a:schemeClr>
+              </a:solidFill>
+            </a:endParaRPr>
+          </a:p>
+        </p:txBody>
+      </p:sp>
+      <p:sp>
+        <p:nvSpPr>
+          <p:cNvPr id="46" name="Rectangle 45">
+            <a:extLst>
+              <a:ext uri="{FF2B5EF4-FFF2-40B4-BE49-F238E27FC236}">
+                <a16:creationId xmlns:a16="http://schemas.microsoft.com/office/drawing/2014/main" id="{E0159EF2-4B1A-756D-FE59-35D7EFC60B4C}"/>
+              </a:ext>
+            </a:extLst>
+          </p:cNvPr>
+          <p:cNvSpPr/>
+          <p:nvPr/>
+        </p:nvSpPr>
+        <p:spPr>
+          <a:xfrm>
+            <a:off x="5049795" y="1360584"/>
+            <a:ext cx="2296168" cy="276999"/>
+          </a:xfrm>
+          <a:prstGeom prst="rect">
+            <a:avLst/>
+          </a:prstGeom>
+        </p:spPr>
+        <p:txBody>
+          <a:bodyPr wrap="square">
+            <a:spAutoFit/>
+          </a:bodyPr>
+          <a:lstStyle/>
+          <a:p>
+            <a:r>
+              <a:rPr lang="en-US" sz="1200" dirty="0"/>
+              <a:t>C Module MicroUI-DMA2D</a:t>
+            </a:r>
+          </a:p>
+        </p:txBody>
+      </p:sp>
+      <p:sp>
+        <p:nvSpPr>
+          <p:cNvPr id="60" name="Rounded Rectangle 29">
+            <a:extLst>
+              <a:ext uri="{FF2B5EF4-FFF2-40B4-BE49-F238E27FC236}">
+                <a16:creationId xmlns:a16="http://schemas.microsoft.com/office/drawing/2014/main" id="{48D5C952-7225-78E6-0A4D-073786260F20}"/>
+              </a:ext>
+            </a:extLst>
+          </p:cNvPr>
+          <p:cNvSpPr/>
+          <p:nvPr/>
+        </p:nvSpPr>
+        <p:spPr>
+          <a:xfrm>
+            <a:off x="5151462" y="1732988"/>
+            <a:ext cx="1645920" cy="288000"/>
+          </a:xfrm>
+          <a:prstGeom prst="roundRect">
+            <a:avLst/>
+          </a:prstGeom>
+          <a:solidFill>
+            <a:srgbClr val="00AEC7"/>
+          </a:solidFill>
+          <a:ln>
+            <a:noFill/>
+          </a:ln>
+        </p:spPr>
+        <p:style>
+          <a:lnRef idx="2">
+            <a:schemeClr val="accent1">
+              <a:shade val="50000"/>
+            </a:schemeClr>
+          </a:lnRef>
+          <a:fillRef idx="1">
+            <a:schemeClr val="accent1"/>
+          </a:fillRef>
+          <a:effectRef idx="0">
+            <a:schemeClr val="accent1"/>
+          </a:effectRef>
+          <a:fontRef idx="minor">
+            <a:schemeClr val="lt1"/>
+          </a:fontRef>
+        </p:style>
+        <p:txBody>
+          <a:bodyPr rtlCol="0" anchor="ctr"/>
+          <a:lstStyle>
+            <a:defPPr>
+              <a:defRPr lang="en-US"/>
+            </a:defPPr>
+            <a:lvl1pPr marL="0" algn="l" defTabSz="914377" rtl="0" eaLnBrk="1" latinLnBrk="0" hangingPunct="1">
+              <a:defRPr sz="1800" kern="1200">
+                <a:solidFill>
+                  <a:schemeClr val="lt1"/>
+                </a:solidFill>
+                <a:latin typeface="+mn-lt"/>
+                <a:ea typeface="+mn-ea"/>
+                <a:cs typeface="+mn-cs"/>
+              </a:defRPr>
+            </a:lvl1pPr>
+            <a:lvl2pPr marL="457189" algn="l" defTabSz="914377" rtl="0" eaLnBrk="1" latinLnBrk="0" hangingPunct="1">
+              <a:defRPr sz="1800" kern="1200">
+                <a:solidFill>
+                  <a:schemeClr val="lt1"/>
+                </a:solidFill>
+                <a:latin typeface="+mn-lt"/>
+                <a:ea typeface="+mn-ea"/>
+                <a:cs typeface="+mn-cs"/>
+              </a:defRPr>
+            </a:lvl2pPr>
+            <a:lvl3pPr marL="914377" algn="l" defTabSz="914377" rtl="0" eaLnBrk="1" latinLnBrk="0" hangingPunct="1">
+              <a:defRPr sz="1800" kern="1200">
+                <a:solidFill>
+                  <a:schemeClr val="lt1"/>
+                </a:solidFill>
+                <a:latin typeface="+mn-lt"/>
+                <a:ea typeface="+mn-ea"/>
+                <a:cs typeface="+mn-cs"/>
+              </a:defRPr>
+            </a:lvl3pPr>
+            <a:lvl4pPr marL="1371566" algn="l" defTabSz="914377" rtl="0" eaLnBrk="1" latinLnBrk="0" hangingPunct="1">
+              <a:defRPr sz="1800" kern="1200">
+                <a:solidFill>
+                  <a:schemeClr val="lt1"/>
+                </a:solidFill>
+                <a:latin typeface="+mn-lt"/>
+                <a:ea typeface="+mn-ea"/>
+                <a:cs typeface="+mn-cs"/>
+              </a:defRPr>
+            </a:lvl4pPr>
+            <a:lvl5pPr marL="1828754" algn="l" defTabSz="914377" rtl="0" eaLnBrk="1" latinLnBrk="0" hangingPunct="1">
+              <a:defRPr sz="1800" kern="1200">
+                <a:solidFill>
+                  <a:schemeClr val="lt1"/>
+                </a:solidFill>
+                <a:latin typeface="+mn-lt"/>
+                <a:ea typeface="+mn-ea"/>
+                <a:cs typeface="+mn-cs"/>
+              </a:defRPr>
+            </a:lvl5pPr>
+            <a:lvl6pPr marL="2285943" algn="l" defTabSz="914377" rtl="0" eaLnBrk="1" latinLnBrk="0" hangingPunct="1">
+              <a:defRPr sz="1800" kern="1200">
+                <a:solidFill>
+                  <a:schemeClr val="lt1"/>
+                </a:solidFill>
+                <a:latin typeface="+mn-lt"/>
+                <a:ea typeface="+mn-ea"/>
+                <a:cs typeface="+mn-cs"/>
+              </a:defRPr>
+            </a:lvl6pPr>
+            <a:lvl7pPr marL="2743131" algn="l" defTabSz="914377" rtl="0" eaLnBrk="1" latinLnBrk="0" hangingPunct="1">
+              <a:defRPr sz="1800" kern="1200">
+                <a:solidFill>
+                  <a:schemeClr val="lt1"/>
+                </a:solidFill>
+                <a:latin typeface="+mn-lt"/>
+                <a:ea typeface="+mn-ea"/>
+                <a:cs typeface="+mn-cs"/>
+              </a:defRPr>
+            </a:lvl7pPr>
+            <a:lvl8pPr marL="3200320" algn="l" defTabSz="914377" rtl="0" eaLnBrk="1" latinLnBrk="0" hangingPunct="1">
+              <a:defRPr sz="1800" kern="1200">
+                <a:solidFill>
+                  <a:schemeClr val="lt1"/>
+                </a:solidFill>
+                <a:latin typeface="+mn-lt"/>
+                <a:ea typeface="+mn-ea"/>
+                <a:cs typeface="+mn-cs"/>
+              </a:defRPr>
+            </a:lvl8pPr>
+            <a:lvl9pPr marL="3657509" algn="l" defTabSz="914377" rtl="0" eaLnBrk="1" latinLnBrk="0" hangingPunct="1">
+              <a:defRPr sz="1800" kern="1200">
+                <a:solidFill>
+                  <a:schemeClr val="lt1"/>
+                </a:solidFill>
+                <a:latin typeface="+mn-lt"/>
+                <a:ea typeface="+mn-ea"/>
+                <a:cs typeface="+mn-cs"/>
+              </a:defRPr>
+            </a:lvl9pPr>
+          </a:lstStyle>
+          <a:p>
+            <a:pPr algn="ctr"/>
+            <a:r>
+              <a:rPr lang="en-US" sz="1200" dirty="0">
+                <a:solidFill>
+                  <a:schemeClr val="bg1"/>
+                </a:solidFill>
+              </a:rPr>
+              <a:t>ui_drawing_dma2d.c</a:t>
+            </a:r>
+          </a:p>
+        </p:txBody>
+      </p:sp>
+      <p:grpSp>
+        <p:nvGrpSpPr>
+          <p:cNvPr id="75" name="Group 74">
+            <a:extLst>
+              <a:ext uri="{FF2B5EF4-FFF2-40B4-BE49-F238E27FC236}">
+                <a16:creationId xmlns:a16="http://schemas.microsoft.com/office/drawing/2014/main" id="{517F6C28-E310-2558-07AC-24EC3DCAFA46}"/>
+              </a:ext>
+            </a:extLst>
+          </p:cNvPr>
+          <p:cNvGrpSpPr/>
+          <p:nvPr/>
+        </p:nvGrpSpPr>
+        <p:grpSpPr>
+          <a:xfrm>
+            <a:off x="7799910" y="1195549"/>
+            <a:ext cx="1786503" cy="1112595"/>
+            <a:chOff x="9856130" y="1428812"/>
+            <a:chExt cx="1786503" cy="1112595"/>
+          </a:xfrm>
+        </p:grpSpPr>
+        <p:sp>
+          <p:nvSpPr>
+            <p:cNvPr id="76" name="Rounded Rectangle 62">
+              <a:extLst>
+                <a:ext uri="{FF2B5EF4-FFF2-40B4-BE49-F238E27FC236}">
+                  <a16:creationId xmlns:a16="http://schemas.microsoft.com/office/drawing/2014/main" id="{A6A6F203-A1AB-C7F8-02EE-57EF5042600E}"/>
+                </a:ext>
+              </a:extLst>
+            </p:cNvPr>
+            <p:cNvSpPr/>
+            <p:nvPr/>
+          </p:nvSpPr>
+          <p:spPr>
+            <a:xfrm>
+              <a:off x="9856130" y="1705811"/>
+              <a:ext cx="1786503" cy="835596"/>
+            </a:xfrm>
+            <a:prstGeom prst="roundRect">
+              <a:avLst>
+                <a:gd name="adj" fmla="val 5059"/>
+              </a:avLst>
+            </a:prstGeom>
+            <a:solidFill>
+              <a:schemeClr val="bg1">
+                <a:lumMod val="95000"/>
+              </a:schemeClr>
+            </a:solidFill>
+            <a:ln w="19050">
+              <a:noFill/>
+            </a:ln>
+          </p:spPr>
+          <p:style>
+            <a:lnRef idx="2">
+              <a:schemeClr val="accent1">
+                <a:shade val="50000"/>
+              </a:schemeClr>
+            </a:lnRef>
+            <a:fillRef idx="1">
+              <a:schemeClr val="accent1"/>
+            </a:fillRef>
+            <a:effectRef idx="0">
+              <a:schemeClr val="accent1"/>
+            </a:effectRef>
+            <a:fontRef idx="minor">
+              <a:schemeClr val="lt1"/>
+            </a:fontRef>
+          </p:style>
+          <p:txBody>
+            <a:bodyPr wrap="square" lIns="0" tIns="0" rIns="0" bIns="0" rtlCol="0" anchor="ctr"/>
+            <a:lstStyle/>
+            <a:p>
+              <a:pPr algn="ctr"/>
+              <a:endParaRPr lang="en-US" sz="1200" dirty="0">
+                <a:solidFill>
+                  <a:schemeClr val="bg1">
+                    <a:lumMod val="95000"/>
+                  </a:schemeClr>
+                </a:solidFill>
+              </a:endParaRPr>
+            </a:p>
+          </p:txBody>
+        </p:sp>
+        <p:sp>
+          <p:nvSpPr>
+            <p:cNvPr id="77" name="Rectangle 76">
+              <a:extLst>
+                <a:ext uri="{FF2B5EF4-FFF2-40B4-BE49-F238E27FC236}">
+                  <a16:creationId xmlns:a16="http://schemas.microsoft.com/office/drawing/2014/main" id="{33246464-2B76-600B-EF6F-D28981C57325}"/>
+                </a:ext>
+              </a:extLst>
+            </p:cNvPr>
+            <p:cNvSpPr/>
+            <p:nvPr/>
+          </p:nvSpPr>
+          <p:spPr>
+            <a:xfrm>
+              <a:off x="9856130" y="1428812"/>
+              <a:ext cx="1557542" cy="276999"/>
+            </a:xfrm>
+            <a:prstGeom prst="rect">
+              <a:avLst/>
+            </a:prstGeom>
+          </p:spPr>
+          <p:txBody>
+            <a:bodyPr wrap="none">
+              <a:spAutoFit/>
+            </a:bodyPr>
+            <a:lstStyle/>
+            <a:p>
+              <a:r>
+                <a:rPr lang="en-US" sz="1200" dirty="0"/>
+                <a:t>Driver STM32 DMA2D</a:t>
+              </a:r>
+            </a:p>
+          </p:txBody>
+        </p:sp>
+        <p:sp>
+          <p:nvSpPr>
+            <p:cNvPr id="78" name="Rounded Rectangle 12">
+              <a:extLst>
+                <a:ext uri="{FF2B5EF4-FFF2-40B4-BE49-F238E27FC236}">
+                  <a16:creationId xmlns:a16="http://schemas.microsoft.com/office/drawing/2014/main" id="{301B2FC0-8609-2028-8552-37BABDD6B973}"/>
+                </a:ext>
+              </a:extLst>
+            </p:cNvPr>
+            <p:cNvSpPr/>
+            <p:nvPr/>
+          </p:nvSpPr>
+          <p:spPr>
+            <a:xfrm>
+              <a:off x="9920126" y="1811781"/>
+              <a:ext cx="1645920" cy="288000"/>
+            </a:xfrm>
+            <a:prstGeom prst="roundRect">
+              <a:avLst/>
+            </a:prstGeom>
+            <a:solidFill>
+              <a:srgbClr val="6CC24A"/>
+            </a:solidFill>
+            <a:ln>
+              <a:noFill/>
+            </a:ln>
+          </p:spPr>
+          <p:style>
+            <a:lnRef idx="2">
+              <a:schemeClr val="accent1">
+                <a:shade val="50000"/>
+              </a:schemeClr>
+            </a:lnRef>
+            <a:fillRef idx="1">
+              <a:schemeClr val="accent1"/>
+            </a:fillRef>
+            <a:effectRef idx="0">
+              <a:schemeClr val="accent1"/>
+            </a:effectRef>
+            <a:fontRef idx="minor">
+              <a:schemeClr val="lt1"/>
+            </a:fontRef>
+          </p:style>
+          <p:txBody>
+            <a:bodyPr rtlCol="0" anchor="ctr"/>
+            <a:lstStyle>
+              <a:defPPr>
+                <a:defRPr lang="en-US"/>
+              </a:defPPr>
+              <a:lvl1pPr marL="0" algn="l" defTabSz="914377" rtl="0" eaLnBrk="1" latinLnBrk="0" hangingPunct="1">
+                <a:defRPr sz="1800" kern="1200">
+                  <a:solidFill>
+                    <a:schemeClr val="lt1"/>
+                  </a:solidFill>
+                  <a:latin typeface="+mn-lt"/>
+                  <a:ea typeface="+mn-ea"/>
+                  <a:cs typeface="+mn-cs"/>
+                </a:defRPr>
+              </a:lvl1pPr>
+              <a:lvl2pPr marL="457189" algn="l" defTabSz="914377" rtl="0" eaLnBrk="1" latinLnBrk="0" hangingPunct="1">
+                <a:defRPr sz="1800" kern="1200">
+                  <a:solidFill>
+                    <a:schemeClr val="lt1"/>
+                  </a:solidFill>
+                  <a:latin typeface="+mn-lt"/>
+                  <a:ea typeface="+mn-ea"/>
+                  <a:cs typeface="+mn-cs"/>
+                </a:defRPr>
+              </a:lvl2pPr>
+              <a:lvl3pPr marL="914377" algn="l" defTabSz="914377" rtl="0" eaLnBrk="1" latinLnBrk="0" hangingPunct="1">
+                <a:defRPr sz="1800" kern="1200">
+                  <a:solidFill>
+                    <a:schemeClr val="lt1"/>
+                  </a:solidFill>
+                  <a:latin typeface="+mn-lt"/>
+                  <a:ea typeface="+mn-ea"/>
+                  <a:cs typeface="+mn-cs"/>
+                </a:defRPr>
+              </a:lvl3pPr>
+              <a:lvl4pPr marL="1371566" algn="l" defTabSz="914377" rtl="0" eaLnBrk="1" latinLnBrk="0" hangingPunct="1">
+                <a:defRPr sz="1800" kern="1200">
+                  <a:solidFill>
+                    <a:schemeClr val="lt1"/>
+                  </a:solidFill>
+                  <a:latin typeface="+mn-lt"/>
+                  <a:ea typeface="+mn-ea"/>
+                  <a:cs typeface="+mn-cs"/>
+                </a:defRPr>
+              </a:lvl4pPr>
+              <a:lvl5pPr marL="1828754" algn="l" defTabSz="914377" rtl="0" eaLnBrk="1" latinLnBrk="0" hangingPunct="1">
+                <a:defRPr sz="1800" kern="1200">
+                  <a:solidFill>
+                    <a:schemeClr val="lt1"/>
+                  </a:solidFill>
+                  <a:latin typeface="+mn-lt"/>
+                  <a:ea typeface="+mn-ea"/>
+                  <a:cs typeface="+mn-cs"/>
+                </a:defRPr>
+              </a:lvl5pPr>
+              <a:lvl6pPr marL="2285943" algn="l" defTabSz="914377" rtl="0" eaLnBrk="1" latinLnBrk="0" hangingPunct="1">
+                <a:defRPr sz="1800" kern="1200">
+                  <a:solidFill>
+                    <a:schemeClr val="lt1"/>
+                  </a:solidFill>
+                  <a:latin typeface="+mn-lt"/>
+                  <a:ea typeface="+mn-ea"/>
+                  <a:cs typeface="+mn-cs"/>
+                </a:defRPr>
+              </a:lvl6pPr>
+              <a:lvl7pPr marL="2743131" algn="l" defTabSz="914377" rtl="0" eaLnBrk="1" latinLnBrk="0" hangingPunct="1">
+                <a:defRPr sz="1800" kern="1200">
+                  <a:solidFill>
+                    <a:schemeClr val="lt1"/>
+                  </a:solidFill>
+                  <a:latin typeface="+mn-lt"/>
+                  <a:ea typeface="+mn-ea"/>
+                  <a:cs typeface="+mn-cs"/>
+                </a:defRPr>
+              </a:lvl7pPr>
+              <a:lvl8pPr marL="3200320" algn="l" defTabSz="914377" rtl="0" eaLnBrk="1" latinLnBrk="0" hangingPunct="1">
+                <a:defRPr sz="1800" kern="1200">
+                  <a:solidFill>
+                    <a:schemeClr val="lt1"/>
+                  </a:solidFill>
+                  <a:latin typeface="+mn-lt"/>
+                  <a:ea typeface="+mn-ea"/>
+                  <a:cs typeface="+mn-cs"/>
+                </a:defRPr>
+              </a:lvl8pPr>
+              <a:lvl9pPr marL="3657509" algn="l" defTabSz="914377" rtl="0" eaLnBrk="1" latinLnBrk="0" hangingPunct="1">
+                <a:defRPr sz="1800" kern="1200">
+                  <a:solidFill>
+                    <a:schemeClr val="lt1"/>
+                  </a:solidFill>
+                  <a:latin typeface="+mn-lt"/>
+                  <a:ea typeface="+mn-ea"/>
+                  <a:cs typeface="+mn-cs"/>
+                </a:defRPr>
+              </a:lvl9pPr>
+            </a:lstStyle>
+            <a:p>
+              <a:pPr algn="ctr"/>
+              <a:r>
+                <a:rPr lang="en-US" sz="1200" dirty="0">
+                  <a:solidFill>
+                    <a:schemeClr val="bg1"/>
+                  </a:solidFill>
+                </a:rPr>
+                <a:t>[…]</a:t>
+              </a:r>
+            </a:p>
+          </p:txBody>
+        </p:sp>
+        <p:sp>
+          <p:nvSpPr>
+            <p:cNvPr id="79" name="Rounded Rectangle 28">
+              <a:extLst>
+                <a:ext uri="{FF2B5EF4-FFF2-40B4-BE49-F238E27FC236}">
+                  <a16:creationId xmlns:a16="http://schemas.microsoft.com/office/drawing/2014/main" id="{0B332F7B-9B91-58F1-6089-479CE848274B}"/>
+                </a:ext>
+              </a:extLst>
+            </p:cNvPr>
+            <p:cNvSpPr/>
+            <p:nvPr/>
+          </p:nvSpPr>
+          <p:spPr>
+            <a:xfrm>
+              <a:off x="9908678" y="2185734"/>
+              <a:ext cx="1645920" cy="288000"/>
+            </a:xfrm>
+            <a:prstGeom prst="roundRect">
+              <a:avLst/>
+            </a:prstGeom>
+            <a:solidFill>
+              <a:srgbClr val="00AEC7"/>
+            </a:solidFill>
+            <a:ln>
+              <a:noFill/>
+            </a:ln>
+          </p:spPr>
+          <p:style>
+            <a:lnRef idx="2">
+              <a:schemeClr val="accent1">
+                <a:shade val="50000"/>
+              </a:schemeClr>
+            </a:lnRef>
+            <a:fillRef idx="1">
+              <a:schemeClr val="accent1"/>
+            </a:fillRef>
+            <a:effectRef idx="0">
+              <a:schemeClr val="accent1"/>
+            </a:effectRef>
+            <a:fontRef idx="minor">
+              <a:schemeClr val="lt1"/>
+            </a:fontRef>
+          </p:style>
+          <p:txBody>
+            <a:bodyPr rtlCol="0" anchor="ctr"/>
+            <a:lstStyle>
+              <a:defPPr>
+                <a:defRPr lang="en-US"/>
+              </a:defPPr>
+              <a:lvl1pPr marL="0" algn="l" defTabSz="914377" rtl="0" eaLnBrk="1" latinLnBrk="0" hangingPunct="1">
+                <a:defRPr sz="1800" kern="1200">
+                  <a:solidFill>
+                    <a:schemeClr val="lt1"/>
+                  </a:solidFill>
+                  <a:latin typeface="+mn-lt"/>
+                  <a:ea typeface="+mn-ea"/>
+                  <a:cs typeface="+mn-cs"/>
+                </a:defRPr>
+              </a:lvl1pPr>
+              <a:lvl2pPr marL="457189" algn="l" defTabSz="914377" rtl="0" eaLnBrk="1" latinLnBrk="0" hangingPunct="1">
+                <a:defRPr sz="1800" kern="1200">
+                  <a:solidFill>
+                    <a:schemeClr val="lt1"/>
+                  </a:solidFill>
+                  <a:latin typeface="+mn-lt"/>
+                  <a:ea typeface="+mn-ea"/>
+                  <a:cs typeface="+mn-cs"/>
+                </a:defRPr>
+              </a:lvl2pPr>
+              <a:lvl3pPr marL="914377" algn="l" defTabSz="914377" rtl="0" eaLnBrk="1" latinLnBrk="0" hangingPunct="1">
+                <a:defRPr sz="1800" kern="1200">
+                  <a:solidFill>
+                    <a:schemeClr val="lt1"/>
+                  </a:solidFill>
+                  <a:latin typeface="+mn-lt"/>
+                  <a:ea typeface="+mn-ea"/>
+                  <a:cs typeface="+mn-cs"/>
+                </a:defRPr>
+              </a:lvl3pPr>
+              <a:lvl4pPr marL="1371566" algn="l" defTabSz="914377" rtl="0" eaLnBrk="1" latinLnBrk="0" hangingPunct="1">
+                <a:defRPr sz="1800" kern="1200">
+                  <a:solidFill>
+                    <a:schemeClr val="lt1"/>
+                  </a:solidFill>
+                  <a:latin typeface="+mn-lt"/>
+                  <a:ea typeface="+mn-ea"/>
+                  <a:cs typeface="+mn-cs"/>
+                </a:defRPr>
+              </a:lvl4pPr>
+              <a:lvl5pPr marL="1828754" algn="l" defTabSz="914377" rtl="0" eaLnBrk="1" latinLnBrk="0" hangingPunct="1">
+                <a:defRPr sz="1800" kern="1200">
+                  <a:solidFill>
+                    <a:schemeClr val="lt1"/>
+                  </a:solidFill>
+                  <a:latin typeface="+mn-lt"/>
+                  <a:ea typeface="+mn-ea"/>
+                  <a:cs typeface="+mn-cs"/>
+                </a:defRPr>
+              </a:lvl5pPr>
+              <a:lvl6pPr marL="2285943" algn="l" defTabSz="914377" rtl="0" eaLnBrk="1" latinLnBrk="0" hangingPunct="1">
+                <a:defRPr sz="1800" kern="1200">
+                  <a:solidFill>
+                    <a:schemeClr val="lt1"/>
+                  </a:solidFill>
+                  <a:latin typeface="+mn-lt"/>
+                  <a:ea typeface="+mn-ea"/>
+                  <a:cs typeface="+mn-cs"/>
+                </a:defRPr>
+              </a:lvl6pPr>
+              <a:lvl7pPr marL="2743131" algn="l" defTabSz="914377" rtl="0" eaLnBrk="1" latinLnBrk="0" hangingPunct="1">
+                <a:defRPr sz="1800" kern="1200">
+                  <a:solidFill>
+                    <a:schemeClr val="lt1"/>
+                  </a:solidFill>
+                  <a:latin typeface="+mn-lt"/>
+                  <a:ea typeface="+mn-ea"/>
+                  <a:cs typeface="+mn-cs"/>
+                </a:defRPr>
+              </a:lvl7pPr>
+              <a:lvl8pPr marL="3200320" algn="l" defTabSz="914377" rtl="0" eaLnBrk="1" latinLnBrk="0" hangingPunct="1">
+                <a:defRPr sz="1800" kern="1200">
+                  <a:solidFill>
+                    <a:schemeClr val="lt1"/>
+                  </a:solidFill>
+                  <a:latin typeface="+mn-lt"/>
+                  <a:ea typeface="+mn-ea"/>
+                  <a:cs typeface="+mn-cs"/>
+                </a:defRPr>
+              </a:lvl8pPr>
+              <a:lvl9pPr marL="3657509" algn="l" defTabSz="914377" rtl="0" eaLnBrk="1" latinLnBrk="0" hangingPunct="1">
+                <a:defRPr sz="1800" kern="1200">
+                  <a:solidFill>
+                    <a:schemeClr val="lt1"/>
+                  </a:solidFill>
+                  <a:latin typeface="+mn-lt"/>
+                  <a:ea typeface="+mn-ea"/>
+                  <a:cs typeface="+mn-cs"/>
+                </a:defRPr>
+              </a:lvl9pPr>
+            </a:lstStyle>
+            <a:p>
+              <a:pPr algn="ctr"/>
+              <a:r>
+                <a:rPr lang="en-US" sz="1200" dirty="0">
+                  <a:solidFill>
+                    <a:schemeClr val="bg1"/>
+                  </a:solidFill>
+                </a:rPr>
+                <a:t>[…]</a:t>
+              </a:r>
+            </a:p>
+          </p:txBody>
+        </p:sp>
+      </p:grpSp>
+      <p:cxnSp>
+        <p:nvCxnSpPr>
+          <p:cNvPr id="82" name="Straight Arrow Connector 81">
+            <a:extLst>
+              <a:ext uri="{FF2B5EF4-FFF2-40B4-BE49-F238E27FC236}">
+                <a16:creationId xmlns:a16="http://schemas.microsoft.com/office/drawing/2014/main" id="{5524E213-BAA5-24CD-DFD8-10F908BE159A}"/>
+              </a:ext>
+            </a:extLst>
+          </p:cNvPr>
+          <p:cNvCxnSpPr>
+            <a:cxnSpLocks/>
+            <a:stCxn id="60" idx="3"/>
+            <a:endCxn id="76" idx="1"/>
+          </p:cNvCxnSpPr>
+          <p:nvPr/>
+        </p:nvCxnSpPr>
+        <p:spPr>
+          <a:xfrm>
+            <a:off x="6797382" y="1876988"/>
+            <a:ext cx="1002528" cy="13358"/>
+          </a:xfrm>
+          <a:prstGeom prst="straightConnector1">
+            <a:avLst/>
+          </a:prstGeom>
+          <a:ln>
+            <a:tailEnd type="triangle"/>
+          </a:ln>
+        </p:spPr>
+        <p:style>
+          <a:lnRef idx="1">
+            <a:schemeClr val="accent2"/>
+          </a:lnRef>
+          <a:fillRef idx="0">
+            <a:schemeClr val="accent2"/>
+          </a:fillRef>
+          <a:effectRef idx="0">
+            <a:schemeClr val="accent2"/>
+          </a:effectRef>
+          <a:fontRef idx="minor">
+            <a:schemeClr val="tx1"/>
+          </a:fontRef>
+        </p:style>
+      </p:cxnSp>
+      <p:cxnSp>
+        <p:nvCxnSpPr>
+          <p:cNvPr id="86" name="Straight Arrow Connector 85">
+            <a:extLst>
+              <a:ext uri="{FF2B5EF4-FFF2-40B4-BE49-F238E27FC236}">
+                <a16:creationId xmlns:a16="http://schemas.microsoft.com/office/drawing/2014/main" id="{6AD33D90-C3CD-EED5-201E-37B0C7CE3994}"/>
+              </a:ext>
+            </a:extLst>
+          </p:cNvPr>
+          <p:cNvCxnSpPr>
+            <a:cxnSpLocks/>
+            <a:stCxn id="60" idx="1"/>
+            <a:endCxn id="25" idx="3"/>
+          </p:cNvCxnSpPr>
+          <p:nvPr/>
+        </p:nvCxnSpPr>
+        <p:spPr>
+          <a:xfrm flipH="1">
+            <a:off x="4319222" y="1876988"/>
+            <a:ext cx="832240" cy="542764"/>
+          </a:xfrm>
+          <a:prstGeom prst="straightConnector1">
+            <a:avLst/>
+          </a:prstGeom>
+          <a:ln>
+            <a:tailEnd type="triangle"/>
+          </a:ln>
+        </p:spPr>
+        <p:style>
+          <a:lnRef idx="1">
+            <a:schemeClr val="accent1"/>
+          </a:lnRef>
+          <a:fillRef idx="0">
+            <a:schemeClr val="accent1"/>
+          </a:fillRef>
+          <a:effectRef idx="0">
+            <a:schemeClr val="accent1"/>
+          </a:effectRef>
+          <a:fontRef idx="minor">
+            <a:schemeClr val="tx1"/>
+          </a:fontRef>
+        </p:style>
+      </p:cxnSp>
+    </p:spTree>
+    <p:extLst>
+      <p:ext uri="{BB962C8B-B14F-4D97-AF65-F5344CB8AC3E}">
+        <p14:creationId xmlns:p14="http://schemas.microsoft.com/office/powerpoint/2010/main" val="2932953995"/>
       </p:ext>
     </p:extLst>
   </p:cSld>

</xml_diff>